<commit_message>
checked and updated the UGDG
</commit_message>
<xml_diff>
--- a/docs/diagrams/ModelComponentClassDiagram.pptx
+++ b/docs/diagrams/ModelComponentClassDiagram.pptx
@@ -208,7 +208,7 @@
           <a:p>
             <a:fld id="{F5CC4B3F-88C1-4FFA-B1B6-F41C21DC6924}" type="datetimeFigureOut">
               <a:rPr lang="en-US" smtClean="0"/>
-              <a:t>10/30/2018</a:t>
+              <a:t>11/8/18</a:t>
             </a:fld>
             <a:endParaRPr lang="en-US"/>
           </a:p>
@@ -654,7 +654,7 @@
           <a:p>
             <a:fld id="{78C97017-6FC3-485B-9764-EAC9E56C1D49}" type="datetimeFigureOut">
               <a:rPr lang="en-US" smtClean="0"/>
-              <a:t>10/30/2018</a:t>
+              <a:t>11/8/18</a:t>
             </a:fld>
             <a:endParaRPr lang="en-US"/>
           </a:p>
@@ -822,7 +822,7 @@
           <a:p>
             <a:fld id="{78C97017-6FC3-485B-9764-EAC9E56C1D49}" type="datetimeFigureOut">
               <a:rPr lang="en-US" smtClean="0"/>
-              <a:t>10/30/2018</a:t>
+              <a:t>11/8/18</a:t>
             </a:fld>
             <a:endParaRPr lang="en-US"/>
           </a:p>
@@ -1000,7 +1000,7 @@
           <a:p>
             <a:fld id="{78C97017-6FC3-485B-9764-EAC9E56C1D49}" type="datetimeFigureOut">
               <a:rPr lang="en-US" smtClean="0"/>
-              <a:t>10/30/2018</a:t>
+              <a:t>11/8/18</a:t>
             </a:fld>
             <a:endParaRPr lang="en-US"/>
           </a:p>
@@ -1168,7 +1168,7 @@
           <a:p>
             <a:fld id="{78C97017-6FC3-485B-9764-EAC9E56C1D49}" type="datetimeFigureOut">
               <a:rPr lang="en-US" smtClean="0"/>
-              <a:t>10/30/2018</a:t>
+              <a:t>11/8/18</a:t>
             </a:fld>
             <a:endParaRPr lang="en-US"/>
           </a:p>
@@ -1413,7 +1413,7 @@
           <a:p>
             <a:fld id="{78C97017-6FC3-485B-9764-EAC9E56C1D49}" type="datetimeFigureOut">
               <a:rPr lang="en-US" smtClean="0"/>
-              <a:t>10/30/2018</a:t>
+              <a:t>11/8/18</a:t>
             </a:fld>
             <a:endParaRPr lang="en-US"/>
           </a:p>
@@ -1698,7 +1698,7 @@
           <a:p>
             <a:fld id="{78C97017-6FC3-485B-9764-EAC9E56C1D49}" type="datetimeFigureOut">
               <a:rPr lang="en-US" smtClean="0"/>
-              <a:t>10/30/2018</a:t>
+              <a:t>11/8/18</a:t>
             </a:fld>
             <a:endParaRPr lang="en-US"/>
           </a:p>
@@ -2117,7 +2117,7 @@
           <a:p>
             <a:fld id="{78C97017-6FC3-485B-9764-EAC9E56C1D49}" type="datetimeFigureOut">
               <a:rPr lang="en-US" smtClean="0"/>
-              <a:t>10/30/2018</a:t>
+              <a:t>11/8/18</a:t>
             </a:fld>
             <a:endParaRPr lang="en-US"/>
           </a:p>
@@ -2234,7 +2234,7 @@
           <a:p>
             <a:fld id="{78C97017-6FC3-485B-9764-EAC9E56C1D49}" type="datetimeFigureOut">
               <a:rPr lang="en-US" smtClean="0"/>
-              <a:t>10/30/2018</a:t>
+              <a:t>11/8/18</a:t>
             </a:fld>
             <a:endParaRPr lang="en-US"/>
           </a:p>
@@ -2329,7 +2329,7 @@
           <a:p>
             <a:fld id="{78C97017-6FC3-485B-9764-EAC9E56C1D49}" type="datetimeFigureOut">
               <a:rPr lang="en-US" smtClean="0"/>
-              <a:t>10/30/2018</a:t>
+              <a:t>11/8/18</a:t>
             </a:fld>
             <a:endParaRPr lang="en-US"/>
           </a:p>
@@ -2604,7 +2604,7 @@
           <a:p>
             <a:fld id="{78C97017-6FC3-485B-9764-EAC9E56C1D49}" type="datetimeFigureOut">
               <a:rPr lang="en-US" smtClean="0"/>
-              <a:t>10/30/2018</a:t>
+              <a:t>11/8/18</a:t>
             </a:fld>
             <a:endParaRPr lang="en-US"/>
           </a:p>
@@ -2856,7 +2856,7 @@
           <a:p>
             <a:fld id="{78C97017-6FC3-485B-9764-EAC9E56C1D49}" type="datetimeFigureOut">
               <a:rPr lang="en-US" smtClean="0"/>
-              <a:t>10/30/2018</a:t>
+              <a:t>11/8/18</a:t>
             </a:fld>
             <a:endParaRPr lang="en-US"/>
           </a:p>
@@ -3067,7 +3067,7 @@
           <a:p>
             <a:fld id="{78C97017-6FC3-485B-9764-EAC9E56C1D49}" type="datetimeFigureOut">
               <a:rPr lang="en-US" smtClean="0"/>
-              <a:t>10/30/2018</a:t>
+              <a:t>11/8/18</a:t>
             </a:fld>
             <a:endParaRPr lang="en-US"/>
           </a:p>
@@ -3450,8 +3450,8 @@
         </p:nvSpPr>
         <p:spPr>
           <a:xfrm>
-            <a:off x="-76199" y="1"/>
-            <a:ext cx="9243528" cy="7569644"/>
+            <a:off x="17566" y="-77804"/>
+            <a:ext cx="9243528" cy="6520451"/>
           </a:xfrm>
           <a:prstGeom prst="roundRect">
             <a:avLst>
@@ -3568,18 +3568,18 @@
           <p:cNvCxnSpPr>
             <a:cxnSpLocks/>
             <a:stCxn id="9" idx="1"/>
-            <a:endCxn id="62" idx="2"/>
+            <a:endCxn id="87" idx="2"/>
           </p:cNvCxnSpPr>
           <p:nvPr/>
         </p:nvCxnSpPr>
         <p:spPr>
           <a:xfrm rot="5400000" flipH="1" flipV="1">
-            <a:off x="3387322" y="3007523"/>
-            <a:ext cx="613122" cy="4459404"/>
+            <a:off x="3483368" y="2885380"/>
+            <a:ext cx="639219" cy="4677594"/>
           </a:xfrm>
           <a:prstGeom prst="bentConnector3">
             <a:avLst>
-              <a:gd name="adj1" fmla="val -26668"/>
+              <a:gd name="adj1" fmla="val 22659"/>
             </a:avLst>
           </a:prstGeom>
           <a:ln w="19050">
@@ -3952,16 +3952,106 @@
       </p:sp>
       <p:sp>
         <p:nvSpPr>
-          <p:cNvPr id="49" name="Rectangle 8"/>
+          <p:cNvPr id="51" name="Flowchart: Decision 96"/>
           <p:cNvSpPr/>
           <p:nvPr/>
         </p:nvSpPr>
         <p:spPr>
           <a:xfrm>
-            <a:off x="3966078" y="4553480"/>
-            <a:ext cx="1156969" cy="346760"/>
-          </a:xfrm>
-          <a:prstGeom prst="rect">
+            <a:off x="3580787" y="4646370"/>
+            <a:ext cx="236048" cy="173380"/>
+          </a:xfrm>
+          <a:prstGeom prst="flowChartDecision">
+            <a:avLst/>
+          </a:prstGeom>
+          <a:solidFill>
+            <a:srgbClr val="7030A0"/>
+          </a:solidFill>
+          <a:ln w="19050">
+            <a:solidFill>
+              <a:srgbClr val="7030A0"/>
+            </a:solidFill>
+          </a:ln>
+          <a:effectLst/>
+        </p:spPr>
+        <p:style>
+          <a:lnRef idx="1">
+            <a:schemeClr val="accent6"/>
+          </a:lnRef>
+          <a:fillRef idx="2">
+            <a:schemeClr val="accent6"/>
+          </a:fillRef>
+          <a:effectRef idx="1">
+            <a:schemeClr val="accent6"/>
+          </a:effectRef>
+          <a:fontRef idx="minor">
+            <a:schemeClr val="dk1"/>
+          </a:fontRef>
+        </p:style>
+        <p:txBody>
+          <a:bodyPr rtlCol="0" anchor="ctr"/>
+          <a:lstStyle/>
+          <a:p>
+            <a:pPr algn="ctr"/>
+            <a:endParaRPr lang="en-US" sz="1050"/>
+          </a:p>
+        </p:txBody>
+      </p:sp>
+      <p:cxnSp>
+        <p:nvCxnSpPr>
+          <p:cNvPr id="97" name="Elbow Connector 63"/>
+          <p:cNvCxnSpPr>
+            <a:stCxn id="99" idx="3"/>
+          </p:cNvCxnSpPr>
+          <p:nvPr/>
+        </p:nvCxnSpPr>
+        <p:spPr>
+          <a:xfrm rot="5400000">
+            <a:off x="2809426" y="4413397"/>
+            <a:ext cx="293825" cy="5938"/>
+          </a:xfrm>
+          <a:prstGeom prst="bentConnector3">
+            <a:avLst>
+              <a:gd name="adj1" fmla="val 50000"/>
+            </a:avLst>
+          </a:prstGeom>
+          <a:ln w="19050">
+            <a:solidFill>
+              <a:srgbClr val="7030A0"/>
+            </a:solidFill>
+            <a:prstDash val="sysDot"/>
+            <a:headEnd type="none" w="med" len="med"/>
+            <a:tailEnd type="none" w="med" len="med"/>
+          </a:ln>
+          <a:effectLst/>
+        </p:spPr>
+        <p:style>
+          <a:lnRef idx="1">
+            <a:schemeClr val="accent2"/>
+          </a:lnRef>
+          <a:fillRef idx="2">
+            <a:schemeClr val="accent2"/>
+          </a:fillRef>
+          <a:effectRef idx="1">
+            <a:schemeClr val="accent2"/>
+          </a:effectRef>
+          <a:fontRef idx="minor">
+            <a:schemeClr val="dk1"/>
+          </a:fontRef>
+        </p:style>
+      </p:cxnSp>
+      <p:sp>
+        <p:nvSpPr>
+          <p:cNvPr id="99" name="Isosceles Triangle 102"/>
+          <p:cNvSpPr/>
+          <p:nvPr/>
+        </p:nvSpPr>
+        <p:spPr>
+          <a:xfrm rot="10800000" flipV="1">
+            <a:off x="2818114" y="4112392"/>
+            <a:ext cx="282387" cy="157062"/>
+          </a:xfrm>
+          <a:prstGeom prst="triangle">
             <a:avLst/>
           </a:prstGeom>
           <a:ln w="19050">
@@ -3990,17 +4080,9 @@
           <a:lstStyle/>
           <a:p>
             <a:pPr algn="ctr"/>
-            <a:r>
-              <a:rPr lang="en-US" sz="1050" dirty="0" err="1">
-                <a:solidFill>
-                  <a:srgbClr val="7030A0"/>
-                </a:solidFill>
-              </a:rPr>
-              <a:t>UniquePersonList</a:t>
-            </a:r>
-            <a:endParaRPr lang="en-SG" sz="1050" dirty="0">
+            <a:endParaRPr lang="en-SG" sz="1050" b="1">
               <a:solidFill>
-                <a:srgbClr val="7030A0"/>
+                <a:srgbClr val="92D050"/>
               </a:solidFill>
             </a:endParaRPr>
           </a:p>
@@ -4008,61 +4090,14 @@
       </p:sp>
       <p:sp>
         <p:nvSpPr>
-          <p:cNvPr id="51" name="Flowchart: Decision 96"/>
+          <p:cNvPr id="100" name="Rectangle 8"/>
           <p:cNvSpPr/>
           <p:nvPr/>
         </p:nvSpPr>
         <p:spPr>
           <a:xfrm>
-            <a:off x="3580787" y="4646370"/>
-            <a:ext cx="236048" cy="173380"/>
-          </a:xfrm>
-          <a:prstGeom prst="flowChartDecision">
-            <a:avLst/>
-          </a:prstGeom>
-          <a:solidFill>
-            <a:srgbClr val="7030A0"/>
-          </a:solidFill>
-          <a:ln w="19050">
-            <a:solidFill>
-              <a:srgbClr val="7030A0"/>
-            </a:solidFill>
-          </a:ln>
-          <a:effectLst/>
-        </p:spPr>
-        <p:style>
-          <a:lnRef idx="1">
-            <a:schemeClr val="accent6"/>
-          </a:lnRef>
-          <a:fillRef idx="2">
-            <a:schemeClr val="accent6"/>
-          </a:fillRef>
-          <a:effectRef idx="1">
-            <a:schemeClr val="accent6"/>
-          </a:effectRef>
-          <a:fontRef idx="minor">
-            <a:schemeClr val="dk1"/>
-          </a:fontRef>
-        </p:style>
-        <p:txBody>
-          <a:bodyPr rtlCol="0" anchor="ctr"/>
-          <a:lstStyle/>
-          <a:p>
-            <a:pPr algn="ctr"/>
-            <a:endParaRPr lang="en-US" sz="1050"/>
-          </a:p>
-        </p:txBody>
-      </p:sp>
-      <p:sp>
-        <p:nvSpPr>
-          <p:cNvPr id="62" name="Rectangle 8"/>
-          <p:cNvSpPr/>
-          <p:nvPr/>
-        </p:nvSpPr>
-        <p:spPr>
-          <a:xfrm>
-            <a:off x="5569492" y="4583904"/>
-            <a:ext cx="708186" cy="346760"/>
+            <a:off x="516737" y="3724188"/>
+            <a:ext cx="1443661" cy="364396"/>
           </a:xfrm>
           <a:prstGeom prst="rect">
             <a:avLst/>
@@ -4099,7 +4134,22 @@
                   <a:srgbClr val="7030A0"/>
                 </a:solidFill>
               </a:rPr>
-              <a:t>Person</a:t>
+              <a:t>&lt;&lt;interface&gt;&gt;</a:t>
+            </a:r>
+            <a:br>
+              <a:rPr lang="en-US" sz="1050" dirty="0">
+                <a:solidFill>
+                  <a:srgbClr val="7030A0"/>
+                </a:solidFill>
+              </a:rPr>
+            </a:br>
+            <a:r>
+              <a:rPr lang="en-US" sz="1050" dirty="0" err="1">
+                <a:solidFill>
+                  <a:srgbClr val="7030A0"/>
+                </a:solidFill>
+              </a:rPr>
+              <a:t>ReadOnlyAddressBook</a:t>
             </a:r>
             <a:endParaRPr lang="en-SG" sz="1050" dirty="0">
               <a:solidFill>
@@ -4111,100 +4161,67 @@
       </p:sp>
       <p:sp>
         <p:nvSpPr>
-          <p:cNvPr id="63" name="Flowchart: Decision 96"/>
-          <p:cNvSpPr/>
+          <p:cNvPr id="114" name="TextBox 113"/>
+          <p:cNvSpPr txBox="1"/>
           <p:nvPr/>
         </p:nvSpPr>
         <p:spPr>
-          <a:xfrm>
-            <a:off x="5114566" y="4667514"/>
-            <a:ext cx="236048" cy="173380"/>
-          </a:xfrm>
-          <a:prstGeom prst="flowChartDecision">
+          <a:xfrm rot="16200000">
+            <a:off x="6182962" y="5144503"/>
+            <a:ext cx="881018" cy="430887"/>
+          </a:xfrm>
+          <a:prstGeom prst="rect">
             <a:avLst/>
           </a:prstGeom>
           <a:noFill/>
-          <a:ln w="19050">
-            <a:solidFill>
-              <a:srgbClr val="7030A0"/>
-            </a:solidFill>
-          </a:ln>
-          <a:effectLst/>
-        </p:spPr>
-        <p:style>
-          <a:lnRef idx="1">
-            <a:schemeClr val="accent6"/>
-          </a:lnRef>
-          <a:fillRef idx="2">
-            <a:schemeClr val="accent6"/>
-          </a:fillRef>
-          <a:effectRef idx="1">
-            <a:schemeClr val="accent6"/>
-          </a:effectRef>
-          <a:fontRef idx="minor">
-            <a:schemeClr val="dk1"/>
-          </a:fontRef>
-        </p:style>
-        <p:txBody>
-          <a:bodyPr rtlCol="0" anchor="ctr"/>
-          <a:lstStyle/>
-          <a:p>
-            <a:pPr algn="ctr"/>
-            <a:endParaRPr lang="en-US" sz="1050"/>
-          </a:p>
-        </p:txBody>
-      </p:sp>
-      <p:cxnSp>
-        <p:nvCxnSpPr>
-          <p:cNvPr id="64" name="Elbow Connector 63"/>
-          <p:cNvCxnSpPr>
-            <a:stCxn id="63" idx="3"/>
-            <a:endCxn id="62" idx="1"/>
-          </p:cNvCxnSpPr>
-          <p:nvPr/>
-        </p:nvCxnSpPr>
-        <p:spPr>
-          <a:xfrm>
-            <a:off x="5350614" y="4754204"/>
-            <a:ext cx="218878" cy="3080"/>
-          </a:xfrm>
-          <a:prstGeom prst="bentConnector3">
-            <a:avLst/>
-          </a:prstGeom>
-          <a:ln w="19050">
-            <a:solidFill>
-              <a:srgbClr val="7030A0"/>
-            </a:solidFill>
-            <a:headEnd type="none" w="med" len="med"/>
-            <a:tailEnd type="arrow" w="med" len="med"/>
-          </a:ln>
-          <a:effectLst/>
-        </p:spPr>
-        <p:style>
-          <a:lnRef idx="1">
-            <a:schemeClr val="accent2"/>
-          </a:lnRef>
-          <a:fillRef idx="2">
-            <a:schemeClr val="accent2"/>
-          </a:fillRef>
-          <a:effectRef idx="1">
-            <a:schemeClr val="accent2"/>
-          </a:effectRef>
-          <a:fontRef idx="minor">
-            <a:schemeClr val="dk1"/>
-          </a:fontRef>
-        </p:style>
-      </p:cxnSp>
-      <p:sp>
-        <p:nvSpPr>
-          <p:cNvPr id="76" name="Rectangle 8"/>
+        </p:spPr>
+        <p:txBody>
+          <a:bodyPr wrap="square" rtlCol="0">
+            <a:spAutoFit/>
+          </a:bodyPr>
+          <a:lstStyle/>
+          <a:p>
+            <a:r>
+              <a:rPr lang="en-US" sz="1100" dirty="0">
+                <a:solidFill>
+                  <a:srgbClr val="7030A0"/>
+                </a:solidFill>
+              </a:rPr>
+              <a:t>filtered list</a:t>
+            </a:r>
+            <a:br>
+              <a:rPr lang="en-US" sz="1100" dirty="0">
+                <a:solidFill>
+                  <a:srgbClr val="7030A0"/>
+                </a:solidFill>
+              </a:rPr>
+            </a:br>
+            <a:r>
+              <a:rPr lang="en-US" sz="1100" dirty="0">
+                <a:solidFill>
+                  <a:srgbClr val="7030A0"/>
+                </a:solidFill>
+              </a:rPr>
+              <a:t>for each</a:t>
+            </a:r>
+            <a:endParaRPr lang="en-SG" sz="1100" dirty="0">
+              <a:solidFill>
+                <a:srgbClr val="7030A0"/>
+              </a:solidFill>
+            </a:endParaRPr>
+          </a:p>
+        </p:txBody>
+      </p:sp>
+      <p:sp>
+        <p:nvSpPr>
+          <p:cNvPr id="122" name="Rectangle 8"/>
           <p:cNvSpPr/>
           <p:nvPr/>
         </p:nvSpPr>
         <p:spPr>
           <a:xfrm>
-            <a:off x="7978763" y="5482166"/>
-            <a:ext cx="708186" cy="285783"/>
+            <a:off x="1313216" y="5965329"/>
+            <a:ext cx="1066800" cy="346760"/>
           </a:xfrm>
           <a:prstGeom prst="rect">
             <a:avLst/>
@@ -4241,7 +4258,22 @@
                   <a:srgbClr val="7030A0"/>
                 </a:solidFill>
               </a:rPr>
-              <a:t>Name</a:t>
+              <a:t>&lt;&lt;interface&gt;&gt;</a:t>
+            </a:r>
+            <a:br>
+              <a:rPr lang="en-US" sz="1050">
+                <a:solidFill>
+                  <a:srgbClr val="7030A0"/>
+                </a:solidFill>
+              </a:rPr>
+            </a:br>
+            <a:r>
+              <a:rPr lang="en-US" sz="1050" dirty="0" err="1">
+                <a:solidFill>
+                  <a:srgbClr val="7030A0"/>
+                </a:solidFill>
+              </a:rPr>
+              <a:t>ObservableList</a:t>
             </a:r>
             <a:endParaRPr lang="en-SG" sz="1050" dirty="0">
               <a:solidFill>
@@ -4251,75 +4283,28 @@
           </a:p>
         </p:txBody>
       </p:sp>
-      <p:sp>
-        <p:nvSpPr>
-          <p:cNvPr id="78" name="Flowchart: Decision 96"/>
-          <p:cNvSpPr/>
-          <p:nvPr/>
-        </p:nvSpPr>
-        <p:spPr>
-          <a:xfrm>
-            <a:off x="6297762" y="4674039"/>
-            <a:ext cx="236048" cy="173380"/>
-          </a:xfrm>
-          <a:prstGeom prst="flowChartDecision">
-            <a:avLst/>
-          </a:prstGeom>
-          <a:solidFill>
-            <a:srgbClr val="7030A0"/>
-          </a:solidFill>
-          <a:ln w="19050">
-            <a:solidFill>
-              <a:srgbClr val="7030A0"/>
-            </a:solidFill>
-          </a:ln>
-          <a:effectLst/>
-        </p:spPr>
-        <p:style>
-          <a:lnRef idx="1">
-            <a:schemeClr val="accent6"/>
-          </a:lnRef>
-          <a:fillRef idx="2">
-            <a:schemeClr val="accent6"/>
-          </a:fillRef>
-          <a:effectRef idx="1">
-            <a:schemeClr val="accent6"/>
-          </a:effectRef>
-          <a:fontRef idx="minor">
-            <a:schemeClr val="dk1"/>
-          </a:fontRef>
-        </p:style>
-        <p:txBody>
-          <a:bodyPr rtlCol="0" anchor="ctr"/>
-          <a:lstStyle/>
-          <a:p>
-            <a:pPr algn="ctr"/>
-            <a:endParaRPr lang="en-US" sz="1050"/>
-          </a:p>
-        </p:txBody>
-      </p:sp>
       <p:cxnSp>
         <p:nvCxnSpPr>
-          <p:cNvPr id="79" name="Elbow Connector 78"/>
+          <p:cNvPr id="124" name="Elbow Connector 122"/>
           <p:cNvCxnSpPr>
-            <a:cxnSpLocks/>
-            <a:stCxn id="78" idx="3"/>
-            <a:endCxn id="76" idx="1"/>
+            <a:stCxn id="119" idx="1"/>
+            <a:endCxn id="122" idx="1"/>
           </p:cNvCxnSpPr>
           <p:nvPr/>
         </p:nvCxnSpPr>
         <p:spPr>
-          <a:xfrm>
-            <a:off x="6533810" y="4760729"/>
-            <a:ext cx="1444953" cy="864329"/>
-          </a:xfrm>
-          <a:prstGeom prst="bentConnector3">
+          <a:xfrm rot="16200000" flipH="1">
+            <a:off x="620290" y="5445782"/>
+            <a:ext cx="831471" cy="554381"/>
+          </a:xfrm>
+          <a:prstGeom prst="bentConnector2">
             <a:avLst/>
           </a:prstGeom>
           <a:ln w="19050">
             <a:solidFill>
               <a:srgbClr val="7030A0"/>
             </a:solidFill>
+            <a:prstDash val="sysDot"/>
             <a:headEnd type="none" w="med" len="med"/>
             <a:tailEnd type="arrow" w="med" len="med"/>
           </a:ln>
@@ -4342,14 +4327,131 @@
       </p:cxnSp>
       <p:sp>
         <p:nvSpPr>
-          <p:cNvPr id="80" name="Rectangle 8"/>
+          <p:cNvPr id="54" name="TextBox 53"/>
+          <p:cNvSpPr txBox="1"/>
+          <p:nvPr/>
+        </p:nvSpPr>
+        <p:spPr>
+          <a:xfrm>
+            <a:off x="3685794" y="4837317"/>
+            <a:ext cx="189257" cy="178683"/>
+          </a:xfrm>
+          <a:prstGeom prst="rect">
+            <a:avLst/>
+          </a:prstGeom>
+          <a:noFill/>
+        </p:spPr>
+        <p:txBody>
+          <a:bodyPr wrap="square" lIns="0" tIns="0" rIns="0" bIns="0" rtlCol="0">
+            <a:noAutofit/>
+          </a:bodyPr>
+          <a:lstStyle/>
+          <a:p>
+            <a:pPr algn="ctr"/>
+            <a:r>
+              <a:rPr lang="en-US" sz="1100" dirty="0">
+                <a:solidFill>
+                  <a:srgbClr val="7030A0"/>
+                </a:solidFill>
+              </a:rPr>
+              <a:t>1</a:t>
+            </a:r>
+            <a:endParaRPr lang="en-SG" sz="1100" dirty="0">
+              <a:solidFill>
+                <a:srgbClr val="7030A0"/>
+              </a:solidFill>
+            </a:endParaRPr>
+          </a:p>
+        </p:txBody>
+      </p:sp>
+      <p:sp>
+        <p:nvSpPr>
+          <p:cNvPr id="65" name="TextBox 64"/>
+          <p:cNvSpPr txBox="1"/>
+          <p:nvPr/>
+        </p:nvSpPr>
+        <p:spPr>
+          <a:xfrm>
+            <a:off x="1829209" y="4482553"/>
+            <a:ext cx="170110" cy="137542"/>
+          </a:xfrm>
+          <a:prstGeom prst="rect">
+            <a:avLst/>
+          </a:prstGeom>
+          <a:noFill/>
+        </p:spPr>
+        <p:txBody>
+          <a:bodyPr wrap="square" lIns="0" tIns="0" rIns="0" bIns="0" rtlCol="0">
+            <a:noAutofit/>
+          </a:bodyPr>
+          <a:lstStyle/>
+          <a:p>
+            <a:pPr algn="ctr"/>
+            <a:r>
+              <a:rPr lang="en-US" sz="1100" dirty="0">
+                <a:solidFill>
+                  <a:srgbClr val="7030A0"/>
+                </a:solidFill>
+              </a:rPr>
+              <a:t>1</a:t>
+            </a:r>
+            <a:endParaRPr lang="en-SG" sz="1100" dirty="0">
+              <a:solidFill>
+                <a:srgbClr val="7030A0"/>
+              </a:solidFill>
+            </a:endParaRPr>
+          </a:p>
+        </p:txBody>
+      </p:sp>
+      <p:sp>
+        <p:nvSpPr>
+          <p:cNvPr id="70" name="TextBox 69"/>
+          <p:cNvSpPr txBox="1"/>
+          <p:nvPr/>
+        </p:nvSpPr>
+        <p:spPr>
+          <a:xfrm>
+            <a:off x="5956821" y="4919437"/>
+            <a:ext cx="189257" cy="178683"/>
+          </a:xfrm>
+          <a:prstGeom prst="rect">
+            <a:avLst/>
+          </a:prstGeom>
+          <a:noFill/>
+        </p:spPr>
+        <p:txBody>
+          <a:bodyPr wrap="square" lIns="0" tIns="0" rIns="0" bIns="0" rtlCol="0">
+            <a:noAutofit/>
+          </a:bodyPr>
+          <a:lstStyle/>
+          <a:p>
+            <a:pPr algn="ctr"/>
+            <a:r>
+              <a:rPr lang="en-US" sz="1100" dirty="0">
+                <a:solidFill>
+                  <a:srgbClr val="7030A0"/>
+                </a:solidFill>
+              </a:rPr>
+              <a:t>1</a:t>
+            </a:r>
+            <a:endParaRPr lang="en-SG" sz="1100" dirty="0">
+              <a:solidFill>
+                <a:srgbClr val="7030A0"/>
+              </a:solidFill>
+            </a:endParaRPr>
+          </a:p>
+        </p:txBody>
+      </p:sp>
+      <p:sp>
+        <p:nvSpPr>
+          <p:cNvPr id="55" name="Rectangle 8"/>
           <p:cNvSpPr/>
           <p:nvPr/>
         </p:nvSpPr>
         <p:spPr>
           <a:xfrm>
-            <a:off x="7978763" y="5805144"/>
-            <a:ext cx="708186" cy="285783"/>
+            <a:off x="2425996" y="3724188"/>
+            <a:ext cx="1060683" cy="364396"/>
           </a:xfrm>
           <a:prstGeom prst="rect">
             <a:avLst/>
@@ -4381,941 +4483,6 @@
           <a:p>
             <a:pPr algn="ctr"/>
             <a:r>
-              <a:rPr lang="en-US" sz="1050" dirty="0">
-                <a:solidFill>
-                  <a:srgbClr val="7030A0"/>
-                </a:solidFill>
-              </a:rPr>
-              <a:t>Phone</a:t>
-            </a:r>
-            <a:endParaRPr lang="en-SG" sz="1050" dirty="0">
-              <a:solidFill>
-                <a:srgbClr val="7030A0"/>
-              </a:solidFill>
-            </a:endParaRPr>
-          </a:p>
-        </p:txBody>
-      </p:sp>
-      <p:cxnSp>
-        <p:nvCxnSpPr>
-          <p:cNvPr id="81" name="Elbow Connector 80"/>
-          <p:cNvCxnSpPr>
-            <a:cxnSpLocks/>
-            <a:stCxn id="78" idx="3"/>
-            <a:endCxn id="80" idx="1"/>
-          </p:cNvCxnSpPr>
-          <p:nvPr/>
-        </p:nvCxnSpPr>
-        <p:spPr>
-          <a:xfrm>
-            <a:off x="6533810" y="4760729"/>
-            <a:ext cx="1444953" cy="1187307"/>
-          </a:xfrm>
-          <a:prstGeom prst="bentConnector3">
-            <a:avLst/>
-          </a:prstGeom>
-          <a:ln w="19050">
-            <a:solidFill>
-              <a:srgbClr val="7030A0"/>
-            </a:solidFill>
-            <a:headEnd type="none" w="med" len="med"/>
-            <a:tailEnd type="arrow" w="med" len="med"/>
-          </a:ln>
-          <a:effectLst/>
-        </p:spPr>
-        <p:style>
-          <a:lnRef idx="1">
-            <a:schemeClr val="accent2"/>
-          </a:lnRef>
-          <a:fillRef idx="2">
-            <a:schemeClr val="accent2"/>
-          </a:fillRef>
-          <a:effectRef idx="1">
-            <a:schemeClr val="accent2"/>
-          </a:effectRef>
-          <a:fontRef idx="minor">
-            <a:schemeClr val="dk1"/>
-          </a:fontRef>
-        </p:style>
-      </p:cxnSp>
-      <p:sp>
-        <p:nvSpPr>
-          <p:cNvPr id="83" name="Rectangle 8"/>
-          <p:cNvSpPr/>
-          <p:nvPr/>
-        </p:nvSpPr>
-        <p:spPr>
-          <a:xfrm>
-            <a:off x="7978763" y="6128122"/>
-            <a:ext cx="708186" cy="285783"/>
-          </a:xfrm>
-          <a:prstGeom prst="rect">
-            <a:avLst/>
-          </a:prstGeom>
-          <a:ln w="19050">
-            <a:solidFill>
-              <a:srgbClr val="7030A0"/>
-            </a:solidFill>
-          </a:ln>
-          <a:effectLst/>
-        </p:spPr>
-        <p:style>
-          <a:lnRef idx="1">
-            <a:schemeClr val="accent4"/>
-          </a:lnRef>
-          <a:fillRef idx="2">
-            <a:schemeClr val="accent4"/>
-          </a:fillRef>
-          <a:effectRef idx="1">
-            <a:schemeClr val="accent4"/>
-          </a:effectRef>
-          <a:fontRef idx="minor">
-            <a:schemeClr val="dk1"/>
-          </a:fontRef>
-        </p:style>
-        <p:txBody>
-          <a:bodyPr rtlCol="0" anchor="ctr"/>
-          <a:lstStyle/>
-          <a:p>
-            <a:pPr algn="ctr"/>
-            <a:r>
-              <a:rPr lang="en-US" sz="1050" dirty="0">
-                <a:solidFill>
-                  <a:srgbClr val="7030A0"/>
-                </a:solidFill>
-              </a:rPr>
-              <a:t>Email</a:t>
-            </a:r>
-            <a:endParaRPr lang="en-SG" sz="1050" dirty="0">
-              <a:solidFill>
-                <a:srgbClr val="7030A0"/>
-              </a:solidFill>
-            </a:endParaRPr>
-          </a:p>
-        </p:txBody>
-      </p:sp>
-      <p:cxnSp>
-        <p:nvCxnSpPr>
-          <p:cNvPr id="84" name="Elbow Connector 83"/>
-          <p:cNvCxnSpPr>
-            <a:cxnSpLocks/>
-            <a:stCxn id="78" idx="3"/>
-            <a:endCxn id="83" idx="1"/>
-          </p:cNvCxnSpPr>
-          <p:nvPr/>
-        </p:nvCxnSpPr>
-        <p:spPr>
-          <a:xfrm>
-            <a:off x="6533810" y="4760729"/>
-            <a:ext cx="1444953" cy="1510285"/>
-          </a:xfrm>
-          <a:prstGeom prst="bentConnector3">
-            <a:avLst/>
-          </a:prstGeom>
-          <a:ln w="19050">
-            <a:solidFill>
-              <a:srgbClr val="7030A0"/>
-            </a:solidFill>
-            <a:headEnd type="none" w="med" len="med"/>
-            <a:tailEnd type="arrow" w="med" len="med"/>
-          </a:ln>
-          <a:effectLst/>
-        </p:spPr>
-        <p:style>
-          <a:lnRef idx="1">
-            <a:schemeClr val="accent2"/>
-          </a:lnRef>
-          <a:fillRef idx="2">
-            <a:schemeClr val="accent2"/>
-          </a:fillRef>
-          <a:effectRef idx="1">
-            <a:schemeClr val="accent2"/>
-          </a:effectRef>
-          <a:fontRef idx="minor">
-            <a:schemeClr val="dk1"/>
-          </a:fontRef>
-        </p:style>
-      </p:cxnSp>
-      <p:sp>
-        <p:nvSpPr>
-          <p:cNvPr id="85" name="Rectangle 8"/>
-          <p:cNvSpPr/>
-          <p:nvPr/>
-        </p:nvSpPr>
-        <p:spPr>
-          <a:xfrm>
-            <a:off x="7988690" y="6402589"/>
-            <a:ext cx="708186" cy="285783"/>
-          </a:xfrm>
-          <a:prstGeom prst="rect">
-            <a:avLst/>
-          </a:prstGeom>
-          <a:ln w="19050">
-            <a:solidFill>
-              <a:srgbClr val="7030A0"/>
-            </a:solidFill>
-          </a:ln>
-          <a:effectLst/>
-        </p:spPr>
-        <p:style>
-          <a:lnRef idx="1">
-            <a:schemeClr val="accent4"/>
-          </a:lnRef>
-          <a:fillRef idx="2">
-            <a:schemeClr val="accent4"/>
-          </a:fillRef>
-          <a:effectRef idx="1">
-            <a:schemeClr val="accent4"/>
-          </a:effectRef>
-          <a:fontRef idx="minor">
-            <a:schemeClr val="dk1"/>
-          </a:fontRef>
-        </p:style>
-        <p:txBody>
-          <a:bodyPr rtlCol="0" anchor="ctr"/>
-          <a:lstStyle/>
-          <a:p>
-            <a:pPr algn="ctr"/>
-            <a:r>
-              <a:rPr lang="en-US" sz="1050" dirty="0">
-                <a:solidFill>
-                  <a:srgbClr val="7030A0"/>
-                </a:solidFill>
-              </a:rPr>
-              <a:t>Address</a:t>
-            </a:r>
-            <a:endParaRPr lang="en-SG" sz="1050" dirty="0">
-              <a:solidFill>
-                <a:srgbClr val="7030A0"/>
-              </a:solidFill>
-            </a:endParaRPr>
-          </a:p>
-        </p:txBody>
-      </p:sp>
-      <p:cxnSp>
-        <p:nvCxnSpPr>
-          <p:cNvPr id="86" name="Elbow Connector 85"/>
-          <p:cNvCxnSpPr>
-            <a:cxnSpLocks/>
-            <a:stCxn id="78" idx="3"/>
-            <a:endCxn id="85" idx="1"/>
-          </p:cNvCxnSpPr>
-          <p:nvPr/>
-        </p:nvCxnSpPr>
-        <p:spPr>
-          <a:xfrm>
-            <a:off x="6533810" y="4760729"/>
-            <a:ext cx="1454880" cy="1784752"/>
-          </a:xfrm>
-          <a:prstGeom prst="bentConnector3">
-            <a:avLst/>
-          </a:prstGeom>
-          <a:ln w="19050">
-            <a:solidFill>
-              <a:srgbClr val="7030A0"/>
-            </a:solidFill>
-            <a:headEnd type="none" w="med" len="med"/>
-            <a:tailEnd type="arrow" w="med" len="med"/>
-          </a:ln>
-          <a:effectLst/>
-        </p:spPr>
-        <p:style>
-          <a:lnRef idx="1">
-            <a:schemeClr val="accent2"/>
-          </a:lnRef>
-          <a:fillRef idx="2">
-            <a:schemeClr val="accent2"/>
-          </a:fillRef>
-          <a:effectRef idx="1">
-            <a:schemeClr val="accent2"/>
-          </a:effectRef>
-          <a:fontRef idx="minor">
-            <a:schemeClr val="dk1"/>
-          </a:fontRef>
-        </p:style>
-      </p:cxnSp>
-      <p:cxnSp>
-        <p:nvCxnSpPr>
-          <p:cNvPr id="97" name="Elbow Connector 63"/>
-          <p:cNvCxnSpPr>
-            <a:stCxn id="99" idx="3"/>
-          </p:cNvCxnSpPr>
-          <p:nvPr/>
-        </p:nvCxnSpPr>
-        <p:spPr>
-          <a:xfrm rot="5400000">
-            <a:off x="2809426" y="4413397"/>
-            <a:ext cx="293825" cy="5938"/>
-          </a:xfrm>
-          <a:prstGeom prst="bentConnector3">
-            <a:avLst>
-              <a:gd name="adj1" fmla="val 50000"/>
-            </a:avLst>
-          </a:prstGeom>
-          <a:ln w="19050">
-            <a:solidFill>
-              <a:srgbClr val="7030A0"/>
-            </a:solidFill>
-            <a:prstDash val="sysDot"/>
-            <a:headEnd type="none" w="med" len="med"/>
-            <a:tailEnd type="none" w="med" len="med"/>
-          </a:ln>
-          <a:effectLst/>
-        </p:spPr>
-        <p:style>
-          <a:lnRef idx="1">
-            <a:schemeClr val="accent2"/>
-          </a:lnRef>
-          <a:fillRef idx="2">
-            <a:schemeClr val="accent2"/>
-          </a:fillRef>
-          <a:effectRef idx="1">
-            <a:schemeClr val="accent2"/>
-          </a:effectRef>
-          <a:fontRef idx="minor">
-            <a:schemeClr val="dk1"/>
-          </a:fontRef>
-        </p:style>
-      </p:cxnSp>
-      <p:sp>
-        <p:nvSpPr>
-          <p:cNvPr id="99" name="Isosceles Triangle 102"/>
-          <p:cNvSpPr/>
-          <p:nvPr/>
-        </p:nvSpPr>
-        <p:spPr>
-          <a:xfrm rot="10800000" flipV="1">
-            <a:off x="2818114" y="4112392"/>
-            <a:ext cx="282387" cy="157062"/>
-          </a:xfrm>
-          <a:prstGeom prst="triangle">
-            <a:avLst/>
-          </a:prstGeom>
-          <a:ln w="19050">
-            <a:solidFill>
-              <a:srgbClr val="7030A0"/>
-            </a:solidFill>
-          </a:ln>
-          <a:effectLst/>
-        </p:spPr>
-        <p:style>
-          <a:lnRef idx="1">
-            <a:schemeClr val="accent4"/>
-          </a:lnRef>
-          <a:fillRef idx="2">
-            <a:schemeClr val="accent4"/>
-          </a:fillRef>
-          <a:effectRef idx="1">
-            <a:schemeClr val="accent4"/>
-          </a:effectRef>
-          <a:fontRef idx="minor">
-            <a:schemeClr val="dk1"/>
-          </a:fontRef>
-        </p:style>
-        <p:txBody>
-          <a:bodyPr rtlCol="0" anchor="ctr"/>
-          <a:lstStyle/>
-          <a:p>
-            <a:pPr algn="ctr"/>
-            <a:endParaRPr lang="en-SG" sz="1050" b="1">
-              <a:solidFill>
-                <a:srgbClr val="92D050"/>
-              </a:solidFill>
-            </a:endParaRPr>
-          </a:p>
-        </p:txBody>
-      </p:sp>
-      <p:sp>
-        <p:nvSpPr>
-          <p:cNvPr id="100" name="Rectangle 8"/>
-          <p:cNvSpPr/>
-          <p:nvPr/>
-        </p:nvSpPr>
-        <p:spPr>
-          <a:xfrm>
-            <a:off x="516737" y="3724188"/>
-            <a:ext cx="1443661" cy="364396"/>
-          </a:xfrm>
-          <a:prstGeom prst="rect">
-            <a:avLst/>
-          </a:prstGeom>
-          <a:ln w="19050">
-            <a:solidFill>
-              <a:srgbClr val="7030A0"/>
-            </a:solidFill>
-          </a:ln>
-          <a:effectLst/>
-        </p:spPr>
-        <p:style>
-          <a:lnRef idx="1">
-            <a:schemeClr val="accent4"/>
-          </a:lnRef>
-          <a:fillRef idx="2">
-            <a:schemeClr val="accent4"/>
-          </a:fillRef>
-          <a:effectRef idx="1">
-            <a:schemeClr val="accent4"/>
-          </a:effectRef>
-          <a:fontRef idx="minor">
-            <a:schemeClr val="dk1"/>
-          </a:fontRef>
-        </p:style>
-        <p:txBody>
-          <a:bodyPr rtlCol="0" anchor="ctr"/>
-          <a:lstStyle/>
-          <a:p>
-            <a:pPr algn="ctr"/>
-            <a:r>
-              <a:rPr lang="en-US" sz="1050" dirty="0">
-                <a:solidFill>
-                  <a:srgbClr val="7030A0"/>
-                </a:solidFill>
-              </a:rPr>
-              <a:t>&lt;&lt;interface&gt;&gt;</a:t>
-            </a:r>
-            <a:br>
-              <a:rPr lang="en-US" sz="1050" dirty="0">
-                <a:solidFill>
-                  <a:srgbClr val="7030A0"/>
-                </a:solidFill>
-              </a:rPr>
-            </a:br>
-            <a:r>
-              <a:rPr lang="en-US" sz="1050" dirty="0" err="1">
-                <a:solidFill>
-                  <a:srgbClr val="7030A0"/>
-                </a:solidFill>
-              </a:rPr>
-              <a:t>ReadOnlyAddressBook</a:t>
-            </a:r>
-            <a:endParaRPr lang="en-SG" sz="1050" dirty="0">
-              <a:solidFill>
-                <a:srgbClr val="7030A0"/>
-              </a:solidFill>
-            </a:endParaRPr>
-          </a:p>
-        </p:txBody>
-      </p:sp>
-      <p:sp>
-        <p:nvSpPr>
-          <p:cNvPr id="114" name="TextBox 113"/>
-          <p:cNvSpPr txBox="1"/>
-          <p:nvPr/>
-        </p:nvSpPr>
-        <p:spPr>
-          <a:xfrm rot="16200000">
-            <a:off x="5683996" y="5120322"/>
-            <a:ext cx="881018" cy="430887"/>
-          </a:xfrm>
-          <a:prstGeom prst="rect">
-            <a:avLst/>
-          </a:prstGeom>
-          <a:noFill/>
-        </p:spPr>
-        <p:txBody>
-          <a:bodyPr wrap="square" rtlCol="0">
-            <a:spAutoFit/>
-          </a:bodyPr>
-          <a:lstStyle/>
-          <a:p>
-            <a:r>
-              <a:rPr lang="en-US" sz="1100" dirty="0">
-                <a:solidFill>
-                  <a:srgbClr val="7030A0"/>
-                </a:solidFill>
-              </a:rPr>
-              <a:t>filtered list</a:t>
-            </a:r>
-            <a:br>
-              <a:rPr lang="en-US" sz="1100" dirty="0">
-                <a:solidFill>
-                  <a:srgbClr val="7030A0"/>
-                </a:solidFill>
-              </a:rPr>
-            </a:br>
-            <a:r>
-              <a:rPr lang="en-US" sz="1100" dirty="0">
-                <a:solidFill>
-                  <a:srgbClr val="7030A0"/>
-                </a:solidFill>
-              </a:rPr>
-              <a:t>for each</a:t>
-            </a:r>
-            <a:endParaRPr lang="en-SG" sz="1100" dirty="0">
-              <a:solidFill>
-                <a:srgbClr val="7030A0"/>
-              </a:solidFill>
-            </a:endParaRPr>
-          </a:p>
-        </p:txBody>
-      </p:sp>
-      <p:sp>
-        <p:nvSpPr>
-          <p:cNvPr id="122" name="Rectangle 8"/>
-          <p:cNvSpPr/>
-          <p:nvPr/>
-        </p:nvSpPr>
-        <p:spPr>
-          <a:xfrm>
-            <a:off x="1313216" y="5965329"/>
-            <a:ext cx="1066800" cy="346760"/>
-          </a:xfrm>
-          <a:prstGeom prst="rect">
-            <a:avLst/>
-          </a:prstGeom>
-          <a:ln w="19050">
-            <a:solidFill>
-              <a:srgbClr val="7030A0"/>
-            </a:solidFill>
-          </a:ln>
-          <a:effectLst/>
-        </p:spPr>
-        <p:style>
-          <a:lnRef idx="1">
-            <a:schemeClr val="accent4"/>
-          </a:lnRef>
-          <a:fillRef idx="2">
-            <a:schemeClr val="accent4"/>
-          </a:fillRef>
-          <a:effectRef idx="1">
-            <a:schemeClr val="accent4"/>
-          </a:effectRef>
-          <a:fontRef idx="minor">
-            <a:schemeClr val="dk1"/>
-          </a:fontRef>
-        </p:style>
-        <p:txBody>
-          <a:bodyPr rtlCol="0" anchor="ctr"/>
-          <a:lstStyle/>
-          <a:p>
-            <a:pPr algn="ctr"/>
-            <a:r>
-              <a:rPr lang="en-US" sz="1050" dirty="0">
-                <a:solidFill>
-                  <a:srgbClr val="7030A0"/>
-                </a:solidFill>
-              </a:rPr>
-              <a:t>&lt;&lt;interface&gt;&gt;</a:t>
-            </a:r>
-            <a:br>
-              <a:rPr lang="en-US" sz="1050">
-                <a:solidFill>
-                  <a:srgbClr val="7030A0"/>
-                </a:solidFill>
-              </a:rPr>
-            </a:br>
-            <a:r>
-              <a:rPr lang="en-US" sz="1050" dirty="0" err="1">
-                <a:solidFill>
-                  <a:srgbClr val="7030A0"/>
-                </a:solidFill>
-              </a:rPr>
-              <a:t>ObservableList</a:t>
-            </a:r>
-            <a:endParaRPr lang="en-SG" sz="1050" dirty="0">
-              <a:solidFill>
-                <a:srgbClr val="7030A0"/>
-              </a:solidFill>
-            </a:endParaRPr>
-          </a:p>
-        </p:txBody>
-      </p:sp>
-      <p:cxnSp>
-        <p:nvCxnSpPr>
-          <p:cNvPr id="124" name="Elbow Connector 122"/>
-          <p:cNvCxnSpPr>
-            <a:stCxn id="119" idx="1"/>
-            <a:endCxn id="122" idx="1"/>
-          </p:cNvCxnSpPr>
-          <p:nvPr/>
-        </p:nvCxnSpPr>
-        <p:spPr>
-          <a:xfrm rot="16200000" flipH="1">
-            <a:off x="620290" y="5445782"/>
-            <a:ext cx="831471" cy="554381"/>
-          </a:xfrm>
-          <a:prstGeom prst="bentConnector2">
-            <a:avLst/>
-          </a:prstGeom>
-          <a:ln w="19050">
-            <a:solidFill>
-              <a:srgbClr val="7030A0"/>
-            </a:solidFill>
-            <a:prstDash val="sysDot"/>
-            <a:headEnd type="none" w="med" len="med"/>
-            <a:tailEnd type="arrow" w="med" len="med"/>
-          </a:ln>
-          <a:effectLst/>
-        </p:spPr>
-        <p:style>
-          <a:lnRef idx="1">
-            <a:schemeClr val="accent2"/>
-          </a:lnRef>
-          <a:fillRef idx="2">
-            <a:schemeClr val="accent2"/>
-          </a:fillRef>
-          <a:effectRef idx="1">
-            <a:schemeClr val="accent2"/>
-          </a:effectRef>
-          <a:fontRef idx="minor">
-            <a:schemeClr val="dk1"/>
-          </a:fontRef>
-        </p:style>
-      </p:cxnSp>
-      <p:sp>
-        <p:nvSpPr>
-          <p:cNvPr id="54" name="TextBox 53"/>
-          <p:cNvSpPr txBox="1"/>
-          <p:nvPr/>
-        </p:nvSpPr>
-        <p:spPr>
-          <a:xfrm>
-            <a:off x="3685794" y="4837317"/>
-            <a:ext cx="189257" cy="178683"/>
-          </a:xfrm>
-          <a:prstGeom prst="rect">
-            <a:avLst/>
-          </a:prstGeom>
-          <a:noFill/>
-        </p:spPr>
-        <p:txBody>
-          <a:bodyPr wrap="square" lIns="0" tIns="0" rIns="0" bIns="0" rtlCol="0">
-            <a:noAutofit/>
-          </a:bodyPr>
-          <a:lstStyle/>
-          <a:p>
-            <a:pPr algn="ctr"/>
-            <a:r>
-              <a:rPr lang="en-US" sz="1100" dirty="0">
-                <a:solidFill>
-                  <a:srgbClr val="7030A0"/>
-                </a:solidFill>
-              </a:rPr>
-              <a:t>1</a:t>
-            </a:r>
-            <a:endParaRPr lang="en-SG" sz="1100" dirty="0">
-              <a:solidFill>
-                <a:srgbClr val="7030A0"/>
-              </a:solidFill>
-            </a:endParaRPr>
-          </a:p>
-        </p:txBody>
-      </p:sp>
-      <p:sp>
-        <p:nvSpPr>
-          <p:cNvPr id="61" name="TextBox 60"/>
-          <p:cNvSpPr txBox="1"/>
-          <p:nvPr/>
-        </p:nvSpPr>
-        <p:spPr>
-          <a:xfrm>
-            <a:off x="5391071" y="4823755"/>
-            <a:ext cx="189257" cy="178683"/>
-          </a:xfrm>
-          <a:prstGeom prst="rect">
-            <a:avLst/>
-          </a:prstGeom>
-          <a:noFill/>
-        </p:spPr>
-        <p:txBody>
-          <a:bodyPr wrap="square" lIns="0" tIns="0" rIns="0" bIns="0" rtlCol="0">
-            <a:noAutofit/>
-          </a:bodyPr>
-          <a:lstStyle/>
-          <a:p>
-            <a:pPr algn="ctr"/>
-            <a:r>
-              <a:rPr lang="en-US" sz="1100" dirty="0">
-                <a:solidFill>
-                  <a:srgbClr val="7030A0"/>
-                </a:solidFill>
-              </a:rPr>
-              <a:t>*</a:t>
-            </a:r>
-            <a:endParaRPr lang="en-SG" sz="1100" dirty="0">
-              <a:solidFill>
-                <a:srgbClr val="7030A0"/>
-              </a:solidFill>
-            </a:endParaRPr>
-          </a:p>
-        </p:txBody>
-      </p:sp>
-      <p:sp>
-        <p:nvSpPr>
-          <p:cNvPr id="65" name="TextBox 64"/>
-          <p:cNvSpPr txBox="1"/>
-          <p:nvPr/>
-        </p:nvSpPr>
-        <p:spPr>
-          <a:xfrm>
-            <a:off x="1829209" y="4482553"/>
-            <a:ext cx="170110" cy="137542"/>
-          </a:xfrm>
-          <a:prstGeom prst="rect">
-            <a:avLst/>
-          </a:prstGeom>
-          <a:noFill/>
-        </p:spPr>
-        <p:txBody>
-          <a:bodyPr wrap="square" lIns="0" tIns="0" rIns="0" bIns="0" rtlCol="0">
-            <a:noAutofit/>
-          </a:bodyPr>
-          <a:lstStyle/>
-          <a:p>
-            <a:pPr algn="ctr"/>
-            <a:r>
-              <a:rPr lang="en-US" sz="1100" dirty="0">
-                <a:solidFill>
-                  <a:srgbClr val="7030A0"/>
-                </a:solidFill>
-              </a:rPr>
-              <a:t>1</a:t>
-            </a:r>
-            <a:endParaRPr lang="en-SG" sz="1100" dirty="0">
-              <a:solidFill>
-                <a:srgbClr val="7030A0"/>
-              </a:solidFill>
-            </a:endParaRPr>
-          </a:p>
-        </p:txBody>
-      </p:sp>
-      <p:sp>
-        <p:nvSpPr>
-          <p:cNvPr id="70" name="TextBox 69"/>
-          <p:cNvSpPr txBox="1"/>
-          <p:nvPr/>
-        </p:nvSpPr>
-        <p:spPr>
-          <a:xfrm>
-            <a:off x="5705711" y="4930664"/>
-            <a:ext cx="189257" cy="178683"/>
-          </a:xfrm>
-          <a:prstGeom prst="rect">
-            <a:avLst/>
-          </a:prstGeom>
-          <a:noFill/>
-        </p:spPr>
-        <p:txBody>
-          <a:bodyPr wrap="square" lIns="0" tIns="0" rIns="0" bIns="0" rtlCol="0">
-            <a:noAutofit/>
-          </a:bodyPr>
-          <a:lstStyle/>
-          <a:p>
-            <a:pPr algn="ctr"/>
-            <a:r>
-              <a:rPr lang="en-US" sz="1100" dirty="0">
-                <a:solidFill>
-                  <a:srgbClr val="7030A0"/>
-                </a:solidFill>
-              </a:rPr>
-              <a:t>1</a:t>
-            </a:r>
-            <a:endParaRPr lang="en-SG" sz="1100" dirty="0">
-              <a:solidFill>
-                <a:srgbClr val="7030A0"/>
-              </a:solidFill>
-            </a:endParaRPr>
-          </a:p>
-        </p:txBody>
-      </p:sp>
-      <p:sp>
-        <p:nvSpPr>
-          <p:cNvPr id="52" name="Rectangle 8">
-            <a:extLst>
-              <a:ext uri="{FF2B5EF4-FFF2-40B4-BE49-F238E27FC236}">
-                <a16:creationId xmlns:a16="http://schemas.microsoft.com/office/drawing/2014/main" id="{ABDCDBD2-131A-4B66-A2F2-43BBEE82C773}"/>
-              </a:ext>
-            </a:extLst>
-          </p:cNvPr>
-          <p:cNvSpPr/>
-          <p:nvPr/>
-        </p:nvSpPr>
-        <p:spPr>
-          <a:xfrm>
-            <a:off x="7978763" y="5146745"/>
-            <a:ext cx="708186" cy="285783"/>
-          </a:xfrm>
-          <a:prstGeom prst="rect">
-            <a:avLst/>
-          </a:prstGeom>
-          <a:ln w="19050">
-            <a:solidFill>
-              <a:srgbClr val="7030A0"/>
-            </a:solidFill>
-          </a:ln>
-          <a:effectLst/>
-        </p:spPr>
-        <p:style>
-          <a:lnRef idx="1">
-            <a:schemeClr val="accent4"/>
-          </a:lnRef>
-          <a:fillRef idx="2">
-            <a:schemeClr val="accent4"/>
-          </a:fillRef>
-          <a:effectRef idx="1">
-            <a:schemeClr val="accent4"/>
-          </a:effectRef>
-          <a:fontRef idx="minor">
-            <a:schemeClr val="dk1"/>
-          </a:fontRef>
-        </p:style>
-        <p:txBody>
-          <a:bodyPr rtlCol="0" anchor="ctr"/>
-          <a:lstStyle/>
-          <a:p>
-            <a:pPr algn="ctr"/>
-            <a:r>
-              <a:rPr lang="en-US" sz="1050" dirty="0">
-                <a:solidFill>
-                  <a:srgbClr val="7030A0"/>
-                </a:solidFill>
-              </a:rPr>
-              <a:t>Tag</a:t>
-            </a:r>
-            <a:endParaRPr lang="en-SG" sz="1050" dirty="0">
-              <a:solidFill>
-                <a:srgbClr val="7030A0"/>
-              </a:solidFill>
-            </a:endParaRPr>
-          </a:p>
-        </p:txBody>
-      </p:sp>
-      <p:cxnSp>
-        <p:nvCxnSpPr>
-          <p:cNvPr id="53" name="Elbow Connector 78">
-            <a:extLst>
-              <a:ext uri="{FF2B5EF4-FFF2-40B4-BE49-F238E27FC236}">
-                <a16:creationId xmlns:a16="http://schemas.microsoft.com/office/drawing/2014/main" id="{B97967F8-618A-448B-81FD-CDFD4AF0EC64}"/>
-              </a:ext>
-            </a:extLst>
-          </p:cNvPr>
-          <p:cNvCxnSpPr>
-            <a:cxnSpLocks/>
-            <a:stCxn id="78" idx="3"/>
-            <a:endCxn id="52" idx="1"/>
-          </p:cNvCxnSpPr>
-          <p:nvPr/>
-        </p:nvCxnSpPr>
-        <p:spPr>
-          <a:xfrm>
-            <a:off x="6533810" y="4760729"/>
-            <a:ext cx="1444953" cy="528908"/>
-          </a:xfrm>
-          <a:prstGeom prst="bentConnector3">
-            <a:avLst>
-              <a:gd name="adj1" fmla="val 50000"/>
-            </a:avLst>
-          </a:prstGeom>
-          <a:ln w="19050">
-            <a:solidFill>
-              <a:srgbClr val="7030A0"/>
-            </a:solidFill>
-            <a:headEnd type="none" w="med" len="med"/>
-            <a:tailEnd type="arrow" w="med" len="med"/>
-          </a:ln>
-          <a:effectLst/>
-        </p:spPr>
-        <p:style>
-          <a:lnRef idx="1">
-            <a:schemeClr val="accent2"/>
-          </a:lnRef>
-          <a:fillRef idx="2">
-            <a:schemeClr val="accent2"/>
-          </a:fillRef>
-          <a:effectRef idx="1">
-            <a:schemeClr val="accent2"/>
-          </a:effectRef>
-          <a:fontRef idx="minor">
-            <a:schemeClr val="dk1"/>
-          </a:fontRef>
-        </p:style>
-      </p:cxnSp>
-      <p:sp>
-        <p:nvSpPr>
-          <p:cNvPr id="50" name="TextBox 49">
-            <a:extLst>
-              <a:ext uri="{FF2B5EF4-FFF2-40B4-BE49-F238E27FC236}">
-                <a16:creationId xmlns:a16="http://schemas.microsoft.com/office/drawing/2014/main" id="{B3FA9D57-880F-49C4-AD0B-A64E30D6F403}"/>
-              </a:ext>
-            </a:extLst>
-          </p:cNvPr>
-          <p:cNvSpPr txBox="1"/>
-          <p:nvPr/>
-        </p:nvSpPr>
-        <p:spPr>
-          <a:xfrm>
-            <a:off x="7821656" y="5048273"/>
-            <a:ext cx="189257" cy="178683"/>
-          </a:xfrm>
-          <a:prstGeom prst="rect">
-            <a:avLst/>
-          </a:prstGeom>
-          <a:noFill/>
-        </p:spPr>
-        <p:txBody>
-          <a:bodyPr wrap="square" lIns="0" tIns="0" rIns="0" bIns="0" rtlCol="0">
-            <a:noAutofit/>
-          </a:bodyPr>
-          <a:lstStyle/>
-          <a:p>
-            <a:pPr algn="ctr"/>
-            <a:r>
-              <a:rPr lang="en-US" sz="1100" dirty="0">
-                <a:solidFill>
-                  <a:srgbClr val="7030A0"/>
-                </a:solidFill>
-              </a:rPr>
-              <a:t>*</a:t>
-            </a:r>
-            <a:endParaRPr lang="en-SG" sz="1100" dirty="0">
-              <a:solidFill>
-                <a:srgbClr val="7030A0"/>
-              </a:solidFill>
-            </a:endParaRPr>
-          </a:p>
-        </p:txBody>
-      </p:sp>
-      <p:sp>
-        <p:nvSpPr>
-          <p:cNvPr id="55" name="Rectangle 8"/>
-          <p:cNvSpPr/>
-          <p:nvPr/>
-        </p:nvSpPr>
-        <p:spPr>
-          <a:xfrm>
-            <a:off x="2425996" y="3724188"/>
-            <a:ext cx="1060683" cy="364396"/>
-          </a:xfrm>
-          <a:prstGeom prst="rect">
-            <a:avLst/>
-          </a:prstGeom>
-          <a:ln w="19050">
-            <a:solidFill>
-              <a:srgbClr val="7030A0"/>
-            </a:solidFill>
-          </a:ln>
-          <a:effectLst/>
-        </p:spPr>
-        <p:style>
-          <a:lnRef idx="1">
-            <a:schemeClr val="accent4"/>
-          </a:lnRef>
-          <a:fillRef idx="2">
-            <a:schemeClr val="accent4"/>
-          </a:fillRef>
-          <a:effectRef idx="1">
-            <a:schemeClr val="accent4"/>
-          </a:effectRef>
-          <a:fontRef idx="minor">
-            <a:schemeClr val="dk1"/>
-          </a:fontRef>
-        </p:style>
-        <p:txBody>
-          <a:bodyPr rtlCol="0" anchor="ctr"/>
-          <a:lstStyle/>
-          <a:p>
-            <a:pPr algn="ctr"/>
-            <a:r>
               <a:rPr lang="en-US" sz="1050" dirty="0" err="1">
                 <a:solidFill>
                   <a:srgbClr val="7030A0"/>
@@ -5331,48 +4498,6 @@
           </a:p>
         </p:txBody>
       </p:sp>
-      <p:cxnSp>
-        <p:nvCxnSpPr>
-          <p:cNvPr id="60" name="Straight Arrow Connector 59"/>
-          <p:cNvCxnSpPr>
-            <a:cxnSpLocks/>
-            <a:stCxn id="51" idx="1"/>
-            <a:endCxn id="49" idx="1"/>
-          </p:cNvCxnSpPr>
-          <p:nvPr/>
-        </p:nvCxnSpPr>
-        <p:spPr>
-          <a:xfrm flipV="1">
-            <a:off x="3580787" y="4726860"/>
-            <a:ext cx="385291" cy="6200"/>
-          </a:xfrm>
-          <a:prstGeom prst="straightConnector1">
-            <a:avLst/>
-          </a:prstGeom>
-          <a:ln w="19050">
-            <a:solidFill>
-              <a:srgbClr val="7030A0"/>
-            </a:solidFill>
-            <a:headEnd type="none" w="med" len="med"/>
-            <a:tailEnd type="arrow" w="med" len="med"/>
-          </a:ln>
-          <a:effectLst/>
-        </p:spPr>
-        <p:style>
-          <a:lnRef idx="1">
-            <a:schemeClr val="accent2"/>
-          </a:lnRef>
-          <a:fillRef idx="2">
-            <a:schemeClr val="accent2"/>
-          </a:fillRef>
-          <a:effectRef idx="1">
-            <a:schemeClr val="accent2"/>
-          </a:effectRef>
-          <a:fontRef idx="minor">
-            <a:schemeClr val="dk1"/>
-          </a:fontRef>
-        </p:style>
-      </p:cxnSp>
       <p:sp>
         <p:nvSpPr>
           <p:cNvPr id="68" name="Isosceles Triangle 102"/>
@@ -5480,18 +4605,20 @@
           </p:cNvPr>
           <p:cNvCxnSpPr>
             <a:cxnSpLocks/>
-            <a:stCxn id="51" idx="0"/>
+            <a:stCxn id="51" idx="3"/>
             <a:endCxn id="82" idx="1"/>
           </p:cNvCxnSpPr>
           <p:nvPr/>
         </p:nvCxnSpPr>
         <p:spPr>
-          <a:xfrm rot="5400000" flipH="1" flipV="1">
-            <a:off x="3505391" y="4217632"/>
-            <a:ext cx="622158" cy="235319"/>
-          </a:xfrm>
-          <a:prstGeom prst="bentConnector2">
-            <a:avLst/>
+          <a:xfrm>
+            <a:off x="3816835" y="4733060"/>
+            <a:ext cx="231762" cy="1656"/>
+          </a:xfrm>
+          <a:prstGeom prst="bentConnector3">
+            <a:avLst>
+              <a:gd name="adj1" fmla="val 50000"/>
+            </a:avLst>
           </a:prstGeom>
           <a:ln w="19050">
             <a:solidFill>
@@ -5532,7 +4659,7 @@
         </p:nvSpPr>
         <p:spPr>
           <a:xfrm>
-            <a:off x="3934130" y="3850832"/>
+            <a:off x="4048597" y="4561336"/>
             <a:ext cx="1156969" cy="346760"/>
           </a:xfrm>
           <a:prstGeom prst="rect">
@@ -5594,7 +4721,7 @@
         </p:nvSpPr>
         <p:spPr>
           <a:xfrm>
-            <a:off x="5658692" y="3862221"/>
+            <a:off x="5787682" y="4557807"/>
             <a:ext cx="708186" cy="346760"/>
           </a:xfrm>
           <a:prstGeom prst="rect">
@@ -5656,7 +4783,7 @@
         </p:nvSpPr>
         <p:spPr>
           <a:xfrm>
-            <a:off x="5095566" y="3957596"/>
+            <a:off x="5224556" y="4653182"/>
             <a:ext cx="236048" cy="173380"/>
           </a:xfrm>
           <a:prstGeom prst="flowChartDecision">
@@ -5709,7 +4836,7 @@
         </p:nvCxnSpPr>
         <p:spPr>
           <a:xfrm flipV="1">
-            <a:off x="5337066" y="4038393"/>
+            <a:off x="5466056" y="4733979"/>
             <a:ext cx="317618" cy="5893"/>
           </a:xfrm>
           <a:prstGeom prst="bentConnector3">
@@ -5755,7 +4882,7 @@
         </p:nvSpPr>
         <p:spPr>
           <a:xfrm>
-            <a:off x="6377580" y="3940735"/>
+            <a:off x="6506570" y="4636321"/>
             <a:ext cx="236048" cy="173380"/>
           </a:xfrm>
           <a:prstGeom prst="flowChartDecision">
@@ -5812,8 +4939,8 @@
         </p:nvCxnSpPr>
         <p:spPr>
           <a:xfrm>
-            <a:off x="6613628" y="4027425"/>
-            <a:ext cx="1312856" cy="319260"/>
+            <a:off x="6742618" y="4723011"/>
+            <a:ext cx="1183865" cy="210778"/>
           </a:xfrm>
           <a:prstGeom prst="bentConnector3">
             <a:avLst>
@@ -5858,7 +4985,7 @@
         </p:nvSpPr>
         <p:spPr>
           <a:xfrm>
-            <a:off x="7926484" y="4203793"/>
+            <a:off x="7926483" y="4790897"/>
             <a:ext cx="802815" cy="285783"/>
           </a:xfrm>
           <a:prstGeom prst="rect">
@@ -5920,7 +5047,7 @@
         </p:nvSpPr>
         <p:spPr>
           <a:xfrm>
-            <a:off x="7926485" y="4561336"/>
+            <a:off x="7926482" y="5212470"/>
             <a:ext cx="802815" cy="285783"/>
           </a:xfrm>
           <a:prstGeom prst="rect">
@@ -5986,8 +5113,8 @@
         </p:nvCxnSpPr>
         <p:spPr>
           <a:xfrm>
-            <a:off x="6613628" y="4027425"/>
-            <a:ext cx="1312857" cy="676803"/>
+            <a:off x="6742618" y="4723011"/>
+            <a:ext cx="1183864" cy="632351"/>
           </a:xfrm>
           <a:prstGeom prst="bentConnector3">
             <a:avLst>
@@ -6032,7 +5159,7 @@
         </p:nvSpPr>
         <p:spPr>
           <a:xfrm>
-            <a:off x="3950526" y="2862526"/>
+            <a:off x="4057310" y="3107269"/>
             <a:ext cx="1164040" cy="346760"/>
           </a:xfrm>
           <a:prstGeom prst="rect">
@@ -6091,18 +5218,20 @@
           </p:cNvPr>
           <p:cNvCxnSpPr>
             <a:cxnSpLocks/>
-            <a:stCxn id="51" idx="0"/>
-            <a:endCxn id="57" idx="1"/>
+            <a:stCxn id="95" idx="2"/>
+            <a:endCxn id="57" idx="0"/>
           </p:cNvCxnSpPr>
           <p:nvPr/>
         </p:nvCxnSpPr>
         <p:spPr>
-          <a:xfrm rot="5400000" flipH="1" flipV="1">
-            <a:off x="3019436" y="3715281"/>
-            <a:ext cx="1610464" cy="251715"/>
-          </a:xfrm>
-          <a:prstGeom prst="bentConnector2">
-            <a:avLst/>
+          <a:xfrm rot="5400000">
+            <a:off x="4780294" y="1731989"/>
+            <a:ext cx="1234316" cy="1516244"/>
+          </a:xfrm>
+          <a:prstGeom prst="bentConnector3">
+            <a:avLst>
+              <a:gd name="adj1" fmla="val 50000"/>
+            </a:avLst>
           </a:prstGeom>
           <a:ln w="19050">
             <a:solidFill>
@@ -6143,7 +5272,7 @@
         </p:nvSpPr>
         <p:spPr>
           <a:xfrm>
-            <a:off x="3945566" y="1502038"/>
+            <a:off x="4048597" y="1516566"/>
             <a:ext cx="1164040" cy="346760"/>
           </a:xfrm>
           <a:prstGeom prst="rect">
@@ -6209,8 +5338,8 @@
         </p:nvCxnSpPr>
         <p:spPr>
           <a:xfrm rot="5400000" flipH="1" flipV="1">
-            <a:off x="2336712" y="3037517"/>
-            <a:ext cx="2970952" cy="246755"/>
+            <a:off x="2395492" y="2993265"/>
+            <a:ext cx="2956424" cy="349786"/>
           </a:xfrm>
           <a:prstGeom prst="bentConnector2">
             <a:avLst/>
@@ -6254,7 +5383,7 @@
         </p:nvSpPr>
         <p:spPr>
           <a:xfrm>
-            <a:off x="5101018" y="2978889"/>
+            <a:off x="5223677" y="3230675"/>
             <a:ext cx="236048" cy="173380"/>
           </a:xfrm>
           <a:prstGeom prst="flowChartDecision">
@@ -6305,7 +5434,7 @@
         </p:nvSpPr>
         <p:spPr>
           <a:xfrm>
-            <a:off x="5099356" y="1598099"/>
+            <a:off x="5202387" y="1612627"/>
             <a:ext cx="236048" cy="173380"/>
           </a:xfrm>
           <a:prstGeom prst="flowChartDecision">
@@ -6359,9 +5488,9 @@
           <p:nvPr/>
         </p:nvCxnSpPr>
         <p:spPr>
-          <a:xfrm>
-            <a:off x="5337066" y="3065579"/>
-            <a:ext cx="293844" cy="5649"/>
+          <a:xfrm flipV="1">
+            <a:off x="5459725" y="3315026"/>
+            <a:ext cx="338659" cy="2339"/>
           </a:xfrm>
           <a:prstGeom prst="bentConnector3">
             <a:avLst>
@@ -6410,8 +5539,8 @@
         </p:nvCxnSpPr>
         <p:spPr>
           <a:xfrm>
-            <a:off x="5335404" y="1684789"/>
-            <a:ext cx="295506" cy="2309"/>
+            <a:off x="5438435" y="1699317"/>
+            <a:ext cx="363046" cy="256"/>
           </a:xfrm>
           <a:prstGeom prst="bentConnector3">
             <a:avLst>
@@ -6456,7 +5585,7 @@
         </p:nvSpPr>
         <p:spPr>
           <a:xfrm>
-            <a:off x="5630910" y="2897848"/>
+            <a:off x="5798384" y="3141646"/>
             <a:ext cx="708186" cy="346760"/>
           </a:xfrm>
           <a:prstGeom prst="rect">
@@ -6518,7 +5647,7 @@
         </p:nvSpPr>
         <p:spPr>
           <a:xfrm>
-            <a:off x="5630910" y="1513718"/>
+            <a:off x="5801481" y="1526193"/>
             <a:ext cx="708186" cy="346760"/>
           </a:xfrm>
           <a:prstGeom prst="rect">
@@ -6580,7 +5709,7 @@
         </p:nvSpPr>
         <p:spPr>
           <a:xfrm>
-            <a:off x="6334922" y="1598099"/>
+            <a:off x="6513672" y="1604560"/>
             <a:ext cx="236048" cy="173380"/>
           </a:xfrm>
           <a:prstGeom prst="flowChartDecision">
@@ -6633,7 +5762,7 @@
         </p:nvSpPr>
         <p:spPr>
           <a:xfrm>
-            <a:off x="6339096" y="2970766"/>
+            <a:off x="6503488" y="3230675"/>
             <a:ext cx="236048" cy="173380"/>
           </a:xfrm>
           <a:prstGeom prst="flowChartDecision">
@@ -6686,7 +5815,7 @@
         </p:nvSpPr>
         <p:spPr>
           <a:xfrm>
-            <a:off x="7926483" y="3137201"/>
+            <a:off x="7920831" y="3514644"/>
             <a:ext cx="802815" cy="285783"/>
           </a:xfrm>
           <a:prstGeom prst="rect">
@@ -6752,8 +5881,8 @@
         </p:nvCxnSpPr>
         <p:spPr>
           <a:xfrm>
-            <a:off x="6575144" y="3057456"/>
-            <a:ext cx="1351339" cy="222637"/>
+            <a:off x="6739536" y="3317365"/>
+            <a:ext cx="1181295" cy="340171"/>
           </a:xfrm>
           <a:prstGeom prst="bentConnector3">
             <a:avLst>
@@ -6798,7 +5927,7 @@
         </p:nvSpPr>
         <p:spPr>
           <a:xfrm>
-            <a:off x="7937390" y="2760305"/>
+            <a:off x="7916284" y="3087012"/>
             <a:ext cx="802815" cy="285783"/>
           </a:xfrm>
           <a:prstGeom prst="rect">
@@ -6864,8 +5993,8 @@
         </p:nvCxnSpPr>
         <p:spPr>
           <a:xfrm flipV="1">
-            <a:off x="6575144" y="2903197"/>
-            <a:ext cx="1362246" cy="154259"/>
+            <a:off x="6739536" y="3229904"/>
+            <a:ext cx="1176748" cy="87461"/>
           </a:xfrm>
           <a:prstGeom prst="bentConnector3">
             <a:avLst>
@@ -6910,7 +6039,7 @@
         </p:nvSpPr>
         <p:spPr>
           <a:xfrm>
-            <a:off x="7943132" y="2355874"/>
+            <a:off x="7920831" y="2634412"/>
             <a:ext cx="802815" cy="285783"/>
           </a:xfrm>
           <a:prstGeom prst="rect">
@@ -6984,8 +6113,8 @@
         </p:nvCxnSpPr>
         <p:spPr>
           <a:xfrm flipV="1">
-            <a:off x="6575144" y="2498766"/>
-            <a:ext cx="1367988" cy="558690"/>
+            <a:off x="6739536" y="2777304"/>
+            <a:ext cx="1181295" cy="540061"/>
           </a:xfrm>
           <a:prstGeom prst="bentConnector3">
             <a:avLst>
@@ -7018,10 +6147,10 @@
       </p:cxnSp>
       <p:sp>
         <p:nvSpPr>
-          <p:cNvPr id="142" name="Rectangle 8">
+          <p:cNvPr id="143" name="Rectangle 8">
             <a:extLst>
               <a:ext uri="{FF2B5EF4-FFF2-40B4-BE49-F238E27FC236}">
-                <a16:creationId xmlns:a16="http://schemas.microsoft.com/office/drawing/2014/main" id="{65DC92D2-4418-4CFC-9929-F51FBE58847E}"/>
+                <a16:creationId xmlns:a16="http://schemas.microsoft.com/office/drawing/2014/main" id="{E4AE6698-6118-49A1-8DEC-F325F085E10A}"/>
               </a:ext>
             </a:extLst>
           </p:cNvPr>
@@ -7030,7 +6159,7 @@
         </p:nvSpPr>
         <p:spPr>
           <a:xfrm>
-            <a:off x="7821656" y="172782"/>
+            <a:off x="7913758" y="492421"/>
             <a:ext cx="802815" cy="285783"/>
           </a:xfrm>
           <a:prstGeom prst="rect">
@@ -7068,63 +6197,6 @@
                   <a:srgbClr val="7030A0"/>
                 </a:solidFill>
               </a:rPr>
-              <a:t>Tag</a:t>
-            </a:r>
-          </a:p>
-        </p:txBody>
-      </p:sp>
-      <p:sp>
-        <p:nvSpPr>
-          <p:cNvPr id="143" name="Rectangle 8">
-            <a:extLst>
-              <a:ext uri="{FF2B5EF4-FFF2-40B4-BE49-F238E27FC236}">
-                <a16:creationId xmlns:a16="http://schemas.microsoft.com/office/drawing/2014/main" id="{E4AE6698-6118-49A1-8DEC-F325F085E10A}"/>
-              </a:ext>
-            </a:extLst>
-          </p:cNvPr>
-          <p:cNvSpPr/>
-          <p:nvPr/>
-        </p:nvSpPr>
-        <p:spPr>
-          <a:xfrm>
-            <a:off x="7822433" y="529908"/>
-            <a:ext cx="802815" cy="285783"/>
-          </a:xfrm>
-          <a:prstGeom prst="rect">
-            <a:avLst/>
-          </a:prstGeom>
-          <a:ln w="19050">
-            <a:solidFill>
-              <a:srgbClr val="7030A0"/>
-            </a:solidFill>
-          </a:ln>
-          <a:effectLst/>
-        </p:spPr>
-        <p:style>
-          <a:lnRef idx="1">
-            <a:schemeClr val="accent4"/>
-          </a:lnRef>
-          <a:fillRef idx="2">
-            <a:schemeClr val="accent4"/>
-          </a:fillRef>
-          <a:effectRef idx="1">
-            <a:schemeClr val="accent4"/>
-          </a:effectRef>
-          <a:fontRef idx="minor">
-            <a:schemeClr val="dk1"/>
-          </a:fontRef>
-        </p:style>
-        <p:txBody>
-          <a:bodyPr rtlCol="0" anchor="ctr"/>
-          <a:lstStyle/>
-          <a:p>
-            <a:pPr algn="ctr"/>
-            <a:r>
-              <a:rPr lang="en-SG" sz="1050" dirty="0">
-                <a:solidFill>
-                  <a:srgbClr val="7030A0"/>
-                </a:solidFill>
-              </a:rPr>
               <a:t>Status</a:t>
             </a:r>
           </a:p>
@@ -7144,7 +6216,7 @@
         </p:nvSpPr>
         <p:spPr>
           <a:xfrm>
-            <a:off x="7800633" y="924644"/>
+            <a:off x="7913759" y="917984"/>
             <a:ext cx="985596" cy="310801"/>
           </a:xfrm>
           <a:prstGeom prst="rect">
@@ -7210,8 +6282,8 @@
         </p:nvCxnSpPr>
         <p:spPr>
           <a:xfrm flipV="1">
-            <a:off x="6570970" y="315674"/>
-            <a:ext cx="1250686" cy="1369115"/>
+            <a:off x="6749720" y="209750"/>
+            <a:ext cx="1157258" cy="1481500"/>
           </a:xfrm>
           <a:prstGeom prst="bentConnector3">
             <a:avLst>
@@ -7260,8 +6332,8 @@
         </p:nvCxnSpPr>
         <p:spPr>
           <a:xfrm flipV="1">
-            <a:off x="6570970" y="672800"/>
-            <a:ext cx="1251463" cy="1011989"/>
+            <a:off x="6749720" y="635313"/>
+            <a:ext cx="1164038" cy="1055937"/>
           </a:xfrm>
           <a:prstGeom prst="bentConnector3">
             <a:avLst>
@@ -7310,8 +6382,8 @@
         </p:nvCxnSpPr>
         <p:spPr>
           <a:xfrm flipV="1">
-            <a:off x="6570970" y="1080045"/>
-            <a:ext cx="1229663" cy="604744"/>
+            <a:off x="6749720" y="1073385"/>
+            <a:ext cx="1164039" cy="617865"/>
           </a:xfrm>
           <a:prstGeom prst="bentConnector3">
             <a:avLst>
@@ -7342,47 +6414,6 @@
           </a:fontRef>
         </p:style>
       </p:cxnSp>
-      <p:cxnSp>
-        <p:nvCxnSpPr>
-          <p:cNvPr id="162" name="Straight Connector 161">
-            <a:extLst>
-              <a:ext uri="{FF2B5EF4-FFF2-40B4-BE49-F238E27FC236}">
-                <a16:creationId xmlns:a16="http://schemas.microsoft.com/office/drawing/2014/main" id="{4F33EFB9-0269-41DE-9D10-6E64F98FBD95}"/>
-              </a:ext>
-            </a:extLst>
-          </p:cNvPr>
-          <p:cNvCxnSpPr>
-            <a:cxnSpLocks/>
-            <a:stCxn id="95" idx="2"/>
-            <a:endCxn id="94" idx="0"/>
-          </p:cNvCxnSpPr>
-          <p:nvPr/>
-        </p:nvCxnSpPr>
-        <p:spPr>
-          <a:xfrm>
-            <a:off x="5985003" y="1860478"/>
-            <a:ext cx="0" cy="1037370"/>
-          </a:xfrm>
-          <a:prstGeom prst="line">
-            <a:avLst/>
-          </a:prstGeom>
-          <a:ln w="19050"/>
-        </p:spPr>
-        <p:style>
-          <a:lnRef idx="1">
-            <a:schemeClr val="accent4"/>
-          </a:lnRef>
-          <a:fillRef idx="0">
-            <a:schemeClr val="accent4"/>
-          </a:fillRef>
-          <a:effectRef idx="0">
-            <a:schemeClr val="accent4"/>
-          </a:effectRef>
-          <a:fontRef idx="minor">
-            <a:schemeClr val="tx1"/>
-          </a:fontRef>
-        </p:style>
-      </p:cxnSp>
       <p:sp>
         <p:nvSpPr>
           <p:cNvPr id="165" name="TextBox 164">
@@ -7396,8 +6427,8 @@
           <p:nvPr/>
         </p:nvSpPr>
         <p:spPr>
-          <a:xfrm rot="16200000">
-            <a:off x="5400305" y="2339141"/>
+          <a:xfrm>
+            <a:off x="4746633" y="2212385"/>
             <a:ext cx="973343" cy="246221"/>
           </a:xfrm>
           <a:prstGeom prst="rect">
@@ -7435,8 +6466,8 @@
           <p:nvPr/>
         </p:nvSpPr>
         <p:spPr>
-          <a:xfrm>
-            <a:off x="5840891" y="1947108"/>
+          <a:xfrm rot="5400000">
+            <a:off x="5635408" y="2300539"/>
             <a:ext cx="119029" cy="105129"/>
           </a:xfrm>
           <a:prstGeom prst="triangle">
@@ -7487,8 +6518,8 @@
           <p:nvPr/>
         </p:nvSpPr>
         <p:spPr>
-          <a:xfrm rot="5400000">
-            <a:off x="5873914" y="2457520"/>
+          <a:xfrm>
+            <a:off x="5109606" y="2498168"/>
             <a:ext cx="468398" cy="246221"/>
           </a:xfrm>
           <a:prstGeom prst="rect">
@@ -7526,8 +6557,8 @@
           <p:nvPr/>
         </p:nvSpPr>
         <p:spPr>
-          <a:xfrm rot="10800000">
-            <a:off x="6029210" y="2744548"/>
+          <a:xfrm rot="9000000">
+            <a:off x="5095967" y="2574215"/>
             <a:ext cx="119029" cy="105129"/>
           </a:xfrm>
           <a:prstGeom prst="triangle">
@@ -7579,7 +6610,7 @@
         </p:nvSpPr>
         <p:spPr>
           <a:xfrm>
-            <a:off x="7926483" y="3466778"/>
+            <a:off x="7926483" y="3942275"/>
             <a:ext cx="802815" cy="285783"/>
           </a:xfrm>
           <a:prstGeom prst="rect">
@@ -7635,68 +6666,128 @@
           </a:p>
         </p:txBody>
       </p:sp>
-      <p:sp>
-        <p:nvSpPr>
-          <p:cNvPr id="104" name="Rectangle 8">
+      <p:grpSp>
+        <p:nvGrpSpPr>
+          <p:cNvPr id="34" name="Group 33">
             <a:extLst>
               <a:ext uri="{FF2B5EF4-FFF2-40B4-BE49-F238E27FC236}">
-                <a16:creationId xmlns:a16="http://schemas.microsoft.com/office/drawing/2014/main" id="{50FC044C-01BD-4A81-A146-6CB3554AF062}"/>
+                <a16:creationId xmlns:a16="http://schemas.microsoft.com/office/drawing/2014/main" id="{05A46E56-5164-E546-AFFC-9AC86111413E}"/>
               </a:ext>
             </a:extLst>
           </p:cNvPr>
-          <p:cNvSpPr/>
+          <p:cNvGrpSpPr/>
           <p:nvPr/>
-        </p:nvSpPr>
-        <p:spPr>
+        </p:nvGrpSpPr>
+        <p:grpSpPr>
           <a:xfrm>
-            <a:off x="7926484" y="1978262"/>
-            <a:ext cx="802815" cy="285783"/>
-          </a:xfrm>
-          <a:prstGeom prst="rect">
-            <a:avLst/>
-          </a:prstGeom>
-          <a:ln w="19050">
-            <a:solidFill>
-              <a:srgbClr val="7030A0"/>
-            </a:solidFill>
-          </a:ln>
-          <a:effectLst/>
-        </p:spPr>
-        <p:style>
-          <a:lnRef idx="1">
-            <a:schemeClr val="accent4"/>
-          </a:lnRef>
-          <a:fillRef idx="2">
-            <a:schemeClr val="accent4"/>
-          </a:fillRef>
-          <a:effectRef idx="1">
-            <a:schemeClr val="accent4"/>
-          </a:effectRef>
-          <a:fontRef idx="minor">
-            <a:schemeClr val="dk1"/>
-          </a:fontRef>
-        </p:style>
-        <p:txBody>
-          <a:bodyPr rtlCol="0" anchor="ctr"/>
-          <a:lstStyle/>
-          <a:p>
-            <a:pPr algn="ctr"/>
-            <a:r>
-              <a:rPr lang="en-US" sz="1050" dirty="0">
+            <a:off x="7791326" y="2111675"/>
+            <a:ext cx="925248" cy="386493"/>
+            <a:chOff x="7821656" y="1946588"/>
+            <a:chExt cx="925248" cy="386493"/>
+          </a:xfrm>
+        </p:grpSpPr>
+        <p:sp>
+          <p:nvSpPr>
+            <p:cNvPr id="61" name="TextBox 60"/>
+            <p:cNvSpPr txBox="1"/>
+            <p:nvPr/>
+          </p:nvSpPr>
+          <p:spPr>
+            <a:xfrm>
+              <a:off x="7821656" y="1946588"/>
+              <a:ext cx="189257" cy="178683"/>
+            </a:xfrm>
+            <a:prstGeom prst="rect">
+              <a:avLst/>
+            </a:prstGeom>
+            <a:noFill/>
+          </p:spPr>
+          <p:txBody>
+            <a:bodyPr wrap="square" lIns="0" tIns="0" rIns="0" bIns="0" rtlCol="0">
+              <a:noAutofit/>
+            </a:bodyPr>
+            <a:lstStyle/>
+            <a:p>
+              <a:pPr algn="ctr"/>
+              <a:r>
+                <a:rPr lang="en-US" sz="1100" dirty="0">
+                  <a:solidFill>
+                    <a:srgbClr val="7030A0"/>
+                  </a:solidFill>
+                </a:rPr>
+                <a:t>*</a:t>
+              </a:r>
+              <a:endParaRPr lang="en-SG" sz="1100" dirty="0">
                 <a:solidFill>
                   <a:srgbClr val="7030A0"/>
                 </a:solidFill>
-              </a:rPr>
-              <a:t>Tag </a:t>
-            </a:r>
-            <a:endParaRPr lang="en-SG" sz="1050" dirty="0">
+              </a:endParaRPr>
+            </a:p>
+          </p:txBody>
+        </p:sp>
+        <p:sp>
+          <p:nvSpPr>
+            <p:cNvPr id="104" name="Rectangle 8">
+              <a:extLst>
+                <a:ext uri="{FF2B5EF4-FFF2-40B4-BE49-F238E27FC236}">
+                  <a16:creationId xmlns:a16="http://schemas.microsoft.com/office/drawing/2014/main" id="{50FC044C-01BD-4A81-A146-6CB3554AF062}"/>
+                </a:ext>
+              </a:extLst>
+            </p:cNvPr>
+            <p:cNvSpPr/>
+            <p:nvPr/>
+          </p:nvSpPr>
+          <p:spPr>
+            <a:xfrm>
+              <a:off x="7944089" y="2047298"/>
+              <a:ext cx="802815" cy="285783"/>
+            </a:xfrm>
+            <a:prstGeom prst="rect">
+              <a:avLst/>
+            </a:prstGeom>
+            <a:ln w="19050">
               <a:solidFill>
                 <a:srgbClr val="7030A0"/>
               </a:solidFill>
-            </a:endParaRPr>
-          </a:p>
-        </p:txBody>
-      </p:sp>
+            </a:ln>
+            <a:effectLst/>
+          </p:spPr>
+          <p:style>
+            <a:lnRef idx="1">
+              <a:schemeClr val="accent4"/>
+            </a:lnRef>
+            <a:fillRef idx="2">
+              <a:schemeClr val="accent4"/>
+            </a:fillRef>
+            <a:effectRef idx="1">
+              <a:schemeClr val="accent4"/>
+            </a:effectRef>
+            <a:fontRef idx="minor">
+              <a:schemeClr val="dk1"/>
+            </a:fontRef>
+          </p:style>
+          <p:txBody>
+            <a:bodyPr rtlCol="0" anchor="ctr"/>
+            <a:lstStyle/>
+            <a:p>
+              <a:pPr algn="ctr"/>
+              <a:r>
+                <a:rPr lang="en-US" sz="1050" dirty="0">
+                  <a:solidFill>
+                    <a:srgbClr val="7030A0"/>
+                  </a:solidFill>
+                </a:rPr>
+                <a:t>Tag </a:t>
+              </a:r>
+              <a:endParaRPr lang="en-SG" sz="1050" dirty="0">
+                <a:solidFill>
+                  <a:srgbClr val="7030A0"/>
+                </a:solidFill>
+              </a:endParaRPr>
+            </a:p>
+          </p:txBody>
+        </p:sp>
+      </p:grpSp>
       <p:sp>
         <p:nvSpPr>
           <p:cNvPr id="106" name="Rectangle 8">
@@ -7711,7 +6802,7 @@
         </p:nvSpPr>
         <p:spPr>
           <a:xfrm>
-            <a:off x="7937389" y="3777338"/>
+            <a:off x="7926483" y="4367399"/>
             <a:ext cx="802815" cy="285783"/>
           </a:xfrm>
           <a:prstGeom prst="rect">
@@ -7777,8 +6868,8 @@
         </p:nvCxnSpPr>
         <p:spPr>
           <a:xfrm>
-            <a:off x="6575144" y="3057456"/>
-            <a:ext cx="1351339" cy="552214"/>
+            <a:off x="6739536" y="3317365"/>
+            <a:ext cx="1186947" cy="767802"/>
           </a:xfrm>
           <a:prstGeom prst="bentConnector3">
             <a:avLst>
@@ -7827,8 +6918,8 @@
         </p:nvCxnSpPr>
         <p:spPr>
           <a:xfrm flipV="1">
-            <a:off x="6575144" y="2121154"/>
-            <a:ext cx="1351340" cy="936302"/>
+            <a:off x="6739536" y="2355277"/>
+            <a:ext cx="1174223" cy="962088"/>
           </a:xfrm>
           <a:prstGeom prst="bentConnector3">
             <a:avLst>
@@ -7877,8 +6968,8 @@
         </p:nvCxnSpPr>
         <p:spPr>
           <a:xfrm>
-            <a:off x="6575144" y="3057456"/>
-            <a:ext cx="1362245" cy="862774"/>
+            <a:off x="6739536" y="3317365"/>
+            <a:ext cx="1186947" cy="1192926"/>
           </a:xfrm>
           <a:prstGeom prst="bentConnector3">
             <a:avLst>
@@ -7923,7 +7014,7 @@
         </p:nvSpPr>
         <p:spPr>
           <a:xfrm>
-            <a:off x="7931659" y="1590110"/>
+            <a:off x="7915180" y="1784753"/>
             <a:ext cx="802815" cy="285783"/>
           </a:xfrm>
           <a:prstGeom prst="rect">
@@ -7989,8 +7080,243 @@
         </p:nvCxnSpPr>
         <p:spPr>
           <a:xfrm flipV="1">
-            <a:off x="6575144" y="1733002"/>
-            <a:ext cx="1356515" cy="1324454"/>
+            <a:off x="6739536" y="1927645"/>
+            <a:ext cx="1175644" cy="1389720"/>
+          </a:xfrm>
+          <a:prstGeom prst="bentConnector3">
+            <a:avLst>
+              <a:gd name="adj1" fmla="val 50000"/>
+            </a:avLst>
+          </a:prstGeom>
+          <a:ln w="19050">
+            <a:solidFill>
+              <a:srgbClr val="7030A0"/>
+            </a:solidFill>
+            <a:headEnd type="none" w="med" len="med"/>
+            <a:tailEnd type="arrow" w="med" len="med"/>
+          </a:ln>
+          <a:effectLst/>
+        </p:spPr>
+        <p:style>
+          <a:lnRef idx="1">
+            <a:schemeClr val="accent2"/>
+          </a:lnRef>
+          <a:fillRef idx="2">
+            <a:schemeClr val="accent2"/>
+          </a:fillRef>
+          <a:effectRef idx="1">
+            <a:schemeClr val="accent2"/>
+          </a:effectRef>
+          <a:fontRef idx="minor">
+            <a:schemeClr val="dk1"/>
+          </a:fontRef>
+        </p:style>
+      </p:cxnSp>
+      <p:grpSp>
+        <p:nvGrpSpPr>
+          <p:cNvPr id="33" name="Group 32">
+            <a:extLst>
+              <a:ext uri="{FF2B5EF4-FFF2-40B4-BE49-F238E27FC236}">
+                <a16:creationId xmlns:a16="http://schemas.microsoft.com/office/drawing/2014/main" id="{68E91C24-CF42-464C-91E4-F18F39DF0331}"/>
+              </a:ext>
+            </a:extLst>
+          </p:cNvPr>
+          <p:cNvGrpSpPr/>
+          <p:nvPr/>
+        </p:nvGrpSpPr>
+        <p:grpSpPr>
+          <a:xfrm>
+            <a:off x="7791326" y="-42566"/>
+            <a:ext cx="918467" cy="395207"/>
+            <a:chOff x="7706004" y="63358"/>
+            <a:chExt cx="918467" cy="395207"/>
+          </a:xfrm>
+        </p:grpSpPr>
+        <p:sp>
+          <p:nvSpPr>
+            <p:cNvPr id="142" name="Rectangle 8">
+              <a:extLst>
+                <a:ext uri="{FF2B5EF4-FFF2-40B4-BE49-F238E27FC236}">
+                  <a16:creationId xmlns:a16="http://schemas.microsoft.com/office/drawing/2014/main" id="{65DC92D2-4418-4CFC-9929-F51FBE58847E}"/>
+                </a:ext>
+              </a:extLst>
+            </p:cNvPr>
+            <p:cNvSpPr/>
+            <p:nvPr/>
+          </p:nvSpPr>
+          <p:spPr>
+            <a:xfrm>
+              <a:off x="7821656" y="172782"/>
+              <a:ext cx="802815" cy="285783"/>
+            </a:xfrm>
+            <a:prstGeom prst="rect">
+              <a:avLst/>
+            </a:prstGeom>
+            <a:ln w="19050">
+              <a:solidFill>
+                <a:srgbClr val="7030A0"/>
+              </a:solidFill>
+            </a:ln>
+            <a:effectLst/>
+          </p:spPr>
+          <p:style>
+            <a:lnRef idx="1">
+              <a:schemeClr val="accent4"/>
+            </a:lnRef>
+            <a:fillRef idx="2">
+              <a:schemeClr val="accent4"/>
+            </a:fillRef>
+            <a:effectRef idx="1">
+              <a:schemeClr val="accent4"/>
+            </a:effectRef>
+            <a:fontRef idx="minor">
+              <a:schemeClr val="dk1"/>
+            </a:fontRef>
+          </p:style>
+          <p:txBody>
+            <a:bodyPr rtlCol="0" anchor="ctr"/>
+            <a:lstStyle/>
+            <a:p>
+              <a:pPr algn="ctr"/>
+              <a:r>
+                <a:rPr lang="en-SG" sz="1050" dirty="0">
+                  <a:solidFill>
+                    <a:srgbClr val="7030A0"/>
+                  </a:solidFill>
+                </a:rPr>
+                <a:t>Tag</a:t>
+              </a:r>
+            </a:p>
+          </p:txBody>
+        </p:sp>
+        <p:sp>
+          <p:nvSpPr>
+            <p:cNvPr id="125" name="TextBox 124">
+              <a:extLst>
+                <a:ext uri="{FF2B5EF4-FFF2-40B4-BE49-F238E27FC236}">
+                  <a16:creationId xmlns:a16="http://schemas.microsoft.com/office/drawing/2014/main" id="{2038986C-B478-1948-9B4F-7362E97AA72B}"/>
+                </a:ext>
+              </a:extLst>
+            </p:cNvPr>
+            <p:cNvSpPr txBox="1"/>
+            <p:nvPr/>
+          </p:nvSpPr>
+          <p:spPr>
+            <a:xfrm>
+              <a:off x="7706004" y="63358"/>
+              <a:ext cx="189257" cy="178683"/>
+            </a:xfrm>
+            <a:prstGeom prst="rect">
+              <a:avLst/>
+            </a:prstGeom>
+            <a:noFill/>
+          </p:spPr>
+          <p:txBody>
+            <a:bodyPr wrap="square" lIns="0" tIns="0" rIns="0" bIns="0" rtlCol="0">
+              <a:noAutofit/>
+            </a:bodyPr>
+            <a:lstStyle/>
+            <a:p>
+              <a:pPr algn="ctr"/>
+              <a:r>
+                <a:rPr lang="en-US" sz="1100" dirty="0">
+                  <a:solidFill>
+                    <a:srgbClr val="7030A0"/>
+                  </a:solidFill>
+                </a:rPr>
+                <a:t>*</a:t>
+              </a:r>
+              <a:endParaRPr lang="en-SG" sz="1100" dirty="0">
+                <a:solidFill>
+                  <a:srgbClr val="7030A0"/>
+                </a:solidFill>
+              </a:endParaRPr>
+            </a:p>
+          </p:txBody>
+        </p:sp>
+      </p:grpSp>
+      <p:sp>
+        <p:nvSpPr>
+          <p:cNvPr id="129" name="Rectangle 8">
+            <a:extLst>
+              <a:ext uri="{FF2B5EF4-FFF2-40B4-BE49-F238E27FC236}">
+                <a16:creationId xmlns:a16="http://schemas.microsoft.com/office/drawing/2014/main" id="{24DFBBCF-3A74-B04A-8F9B-B02C1368B21B}"/>
+              </a:ext>
+            </a:extLst>
+          </p:cNvPr>
+          <p:cNvSpPr/>
+          <p:nvPr/>
+        </p:nvSpPr>
+        <p:spPr>
+          <a:xfrm>
+            <a:off x="7913759" y="1363180"/>
+            <a:ext cx="708186" cy="310801"/>
+          </a:xfrm>
+          <a:prstGeom prst="rect">
+            <a:avLst/>
+          </a:prstGeom>
+          <a:ln w="19050">
+            <a:solidFill>
+              <a:srgbClr val="7030A0"/>
+            </a:solidFill>
+          </a:ln>
+          <a:effectLst/>
+        </p:spPr>
+        <p:style>
+          <a:lnRef idx="1">
+            <a:schemeClr val="accent4"/>
+          </a:lnRef>
+          <a:fillRef idx="2">
+            <a:schemeClr val="accent4"/>
+          </a:fillRef>
+          <a:effectRef idx="1">
+            <a:schemeClr val="accent4"/>
+          </a:effectRef>
+          <a:fontRef idx="minor">
+            <a:schemeClr val="dk1"/>
+          </a:fontRef>
+        </p:style>
+        <p:txBody>
+          <a:bodyPr rtlCol="0" anchor="ctr"/>
+          <a:lstStyle/>
+          <a:p>
+            <a:pPr algn="ctr"/>
+            <a:r>
+              <a:rPr lang="en-US" sz="1050" dirty="0">
+                <a:solidFill>
+                  <a:srgbClr val="7030A0"/>
+                </a:solidFill>
+              </a:rPr>
+              <a:t>Job</a:t>
+            </a:r>
+            <a:endParaRPr lang="en-SG" sz="1050" dirty="0">
+              <a:solidFill>
+                <a:srgbClr val="7030A0"/>
+              </a:solidFill>
+            </a:endParaRPr>
+          </a:p>
+        </p:txBody>
+      </p:sp>
+      <p:cxnSp>
+        <p:nvCxnSpPr>
+          <p:cNvPr id="130" name="Elbow Connector 78">
+            <a:extLst>
+              <a:ext uri="{FF2B5EF4-FFF2-40B4-BE49-F238E27FC236}">
+                <a16:creationId xmlns:a16="http://schemas.microsoft.com/office/drawing/2014/main" id="{33777545-8A7A-6B43-A1E9-2E71CCF4D1E8}"/>
+              </a:ext>
+            </a:extLst>
+          </p:cNvPr>
+          <p:cNvCxnSpPr>
+            <a:cxnSpLocks/>
+            <a:stCxn id="102" idx="3"/>
+            <a:endCxn id="129" idx="1"/>
+          </p:cNvCxnSpPr>
+          <p:nvPr/>
+        </p:nvCxnSpPr>
+        <p:spPr>
+          <a:xfrm flipV="1">
+            <a:off x="6749720" y="1518581"/>
+            <a:ext cx="1164039" cy="172669"/>
           </a:xfrm>
           <a:prstGeom prst="bentConnector3">
             <a:avLst>

</xml_diff>